<commit_message>
First commit for test editor
</commit_message>
<xml_diff>
--- a/Presentación1.pptx
+++ b/Presentación1.pptx
@@ -6,6 +6,8 @@
   </p:sldMasterIdLst>
   <p:sldIdLst>
     <p:sldId id="256" r:id="rId2"/>
+    <p:sldId id="257" r:id="rId3"/>
+    <p:sldId id="258" r:id="rId4"/>
   </p:sldIdLst>
   <p:sldSz cx="12192000" cy="6858000"/>
   <p:notesSz cx="6858000" cy="9144000"/>
@@ -104,7 +106,392 @@
       </a:defRPr>
     </a:lvl9pPr>
   </p:defaultTextStyle>
+  <p:extLst>
+    <p:ext uri="{EFAFB233-063F-42B5-8137-9DF3F51BA10A}">
+      <p15:sldGuideLst xmlns:p15="http://schemas.microsoft.com/office/powerpoint/2012/main"/>
+    </p:ext>
+  </p:extLst>
 </p:presentation>
+</file>
+
+<file path=ppt/changesInfos/changesInfo1.xml><?xml version="1.0" encoding="utf-8"?>
+<pc:chgInfo xmlns:a="http://schemas.openxmlformats.org/drawingml/2006/main" xmlns:r="http://schemas.openxmlformats.org/officeDocument/2006/relationships" xmlns:ac="http://schemas.microsoft.com/office/drawing/2013/main/command" xmlns:pc="http://schemas.microsoft.com/office/powerpoint/2013/main/command">
+  <pc:docChgLst>
+    <pc:chgData name="Leo Avalos" userId="bf84d2b012f92406" providerId="LiveId" clId="{4DD8F824-29E6-4CBB-8D63-62D3BB649C5E}"/>
+    <pc:docChg chg="undo custSel addSld modSld">
+      <pc:chgData name="Leo Avalos" userId="bf84d2b012f92406" providerId="LiveId" clId="{4DD8F824-29E6-4CBB-8D63-62D3BB649C5E}" dt="2025-05-04T00:47:24.559" v="334" actId="20577"/>
+      <pc:docMkLst>
+        <pc:docMk/>
+      </pc:docMkLst>
+      <pc:sldChg chg="addSp delSp modSp new mod">
+        <pc:chgData name="Leo Avalos" userId="bf84d2b012f92406" providerId="LiveId" clId="{4DD8F824-29E6-4CBB-8D63-62D3BB649C5E}" dt="2025-04-26T22:32:35.297" v="107" actId="478"/>
+        <pc:sldMkLst>
+          <pc:docMk/>
+          <pc:sldMk cId="305804212" sldId="257"/>
+        </pc:sldMkLst>
+        <pc:spChg chg="add mod">
+          <ac:chgData name="Leo Avalos" userId="bf84d2b012f92406" providerId="LiveId" clId="{4DD8F824-29E6-4CBB-8D63-62D3BB649C5E}" dt="2025-04-26T22:31:18.108" v="88" actId="14100"/>
+          <ac:spMkLst>
+            <pc:docMk/>
+            <pc:sldMk cId="305804212" sldId="257"/>
+            <ac:spMk id="4" creationId="{903B948E-62B4-5435-AC7C-F04055CB9C86}"/>
+          </ac:spMkLst>
+        </pc:spChg>
+        <pc:spChg chg="add mod">
+          <ac:chgData name="Leo Avalos" userId="bf84d2b012f92406" providerId="LiveId" clId="{4DD8F824-29E6-4CBB-8D63-62D3BB649C5E}" dt="2025-04-26T22:31:21.644" v="89" actId="14100"/>
+          <ac:spMkLst>
+            <pc:docMk/>
+            <pc:sldMk cId="305804212" sldId="257"/>
+            <ac:spMk id="5" creationId="{5CB0EE3B-A594-B3FB-AAFA-07C73F2CEBBB}"/>
+          </ac:spMkLst>
+        </pc:spChg>
+        <pc:spChg chg="add mod">
+          <ac:chgData name="Leo Avalos" userId="bf84d2b012f92406" providerId="LiveId" clId="{4DD8F824-29E6-4CBB-8D63-62D3BB649C5E}" dt="2025-04-26T22:29:21.417" v="52" actId="1076"/>
+          <ac:spMkLst>
+            <pc:docMk/>
+            <pc:sldMk cId="305804212" sldId="257"/>
+            <ac:spMk id="6" creationId="{F5A3B549-5FC4-16CF-79EA-2FA2472DAEBF}"/>
+          </ac:spMkLst>
+        </pc:spChg>
+        <pc:spChg chg="add mod">
+          <ac:chgData name="Leo Avalos" userId="bf84d2b012f92406" providerId="LiveId" clId="{4DD8F824-29E6-4CBB-8D63-62D3BB649C5E}" dt="2025-04-26T22:31:52.670" v="94" actId="1076"/>
+          <ac:spMkLst>
+            <pc:docMk/>
+            <pc:sldMk cId="305804212" sldId="257"/>
+            <ac:spMk id="7" creationId="{49723FF6-9801-2761-67A8-49CD118A37EC}"/>
+          </ac:spMkLst>
+        </pc:spChg>
+        <pc:spChg chg="add mod">
+          <ac:chgData name="Leo Avalos" userId="bf84d2b012f92406" providerId="LiveId" clId="{4DD8F824-29E6-4CBB-8D63-62D3BB649C5E}" dt="2025-04-26T22:31:55.524" v="95" actId="1076"/>
+          <ac:spMkLst>
+            <pc:docMk/>
+            <pc:sldMk cId="305804212" sldId="257"/>
+            <ac:spMk id="8" creationId="{40FF574B-7DA3-FB45-1127-26056E65F011}"/>
+          </ac:spMkLst>
+        </pc:spChg>
+        <pc:spChg chg="add mod">
+          <ac:chgData name="Leo Avalos" userId="bf84d2b012f92406" providerId="LiveId" clId="{4DD8F824-29E6-4CBB-8D63-62D3BB649C5E}" dt="2025-04-26T22:31:14.773" v="87" actId="1076"/>
+          <ac:spMkLst>
+            <pc:docMk/>
+            <pc:sldMk cId="305804212" sldId="257"/>
+            <ac:spMk id="9" creationId="{7A12CA7F-6869-DB88-ABAC-4B7981DD870C}"/>
+          </ac:spMkLst>
+        </pc:spChg>
+        <pc:spChg chg="add mod">
+          <ac:chgData name="Leo Avalos" userId="bf84d2b012f92406" providerId="LiveId" clId="{4DD8F824-29E6-4CBB-8D63-62D3BB649C5E}" dt="2025-04-26T22:31:57.712" v="96" actId="1076"/>
+          <ac:spMkLst>
+            <pc:docMk/>
+            <pc:sldMk cId="305804212" sldId="257"/>
+            <ac:spMk id="11" creationId="{C4DE9291-9EDE-22F1-6DD5-92955654E89C}"/>
+          </ac:spMkLst>
+        </pc:spChg>
+        <pc:spChg chg="add mod">
+          <ac:chgData name="Leo Avalos" userId="bf84d2b012f92406" providerId="LiveId" clId="{4DD8F824-29E6-4CBB-8D63-62D3BB649C5E}" dt="2025-04-26T22:32:13.448" v="98" actId="1076"/>
+          <ac:spMkLst>
+            <pc:docMk/>
+            <pc:sldMk cId="305804212" sldId="257"/>
+            <ac:spMk id="12" creationId="{D46B4974-1910-C590-B749-60B2E757A778}"/>
+          </ac:spMkLst>
+        </pc:spChg>
+        <pc:spChg chg="add mod">
+          <ac:chgData name="Leo Avalos" userId="bf84d2b012f92406" providerId="LiveId" clId="{4DD8F824-29E6-4CBB-8D63-62D3BB649C5E}" dt="2025-04-26T22:32:32.660" v="106" actId="20577"/>
+          <ac:spMkLst>
+            <pc:docMk/>
+            <pc:sldMk cId="305804212" sldId="257"/>
+            <ac:spMk id="13" creationId="{E23F3EEB-7D65-51A3-D8BF-6DDA1CD629A4}"/>
+          </ac:spMkLst>
+        </pc:spChg>
+        <pc:spChg chg="add mod">
+          <ac:chgData name="Leo Avalos" userId="bf84d2b012f92406" providerId="LiveId" clId="{4DD8F824-29E6-4CBB-8D63-62D3BB649C5E}" dt="2025-04-26T22:32:17.517" v="100" actId="1076"/>
+          <ac:spMkLst>
+            <pc:docMk/>
+            <pc:sldMk cId="305804212" sldId="257"/>
+            <ac:spMk id="14" creationId="{F0DD8A87-6469-8356-34F4-8DF5439DFB7F}"/>
+          </ac:spMkLst>
+        </pc:spChg>
+        <pc:spChg chg="add mod">
+          <ac:chgData name="Leo Avalos" userId="bf84d2b012f92406" providerId="LiveId" clId="{4DD8F824-29E6-4CBB-8D63-62D3BB649C5E}" dt="2025-04-26T22:32:22.985" v="102" actId="1076"/>
+          <ac:spMkLst>
+            <pc:docMk/>
+            <pc:sldMk cId="305804212" sldId="257"/>
+            <ac:spMk id="16" creationId="{D6757AD5-A03F-2C40-4E40-F2EE6C5ED80B}"/>
+          </ac:spMkLst>
+        </pc:spChg>
+        <pc:spChg chg="add mod">
+          <ac:chgData name="Leo Avalos" userId="bf84d2b012f92406" providerId="LiveId" clId="{4DD8F824-29E6-4CBB-8D63-62D3BB649C5E}" dt="2025-04-26T22:32:26.473" v="104" actId="20577"/>
+          <ac:spMkLst>
+            <pc:docMk/>
+            <pc:sldMk cId="305804212" sldId="257"/>
+            <ac:spMk id="17" creationId="{4F857F12-4C18-B4C7-54AF-227CAAD247A0}"/>
+          </ac:spMkLst>
+        </pc:spChg>
+      </pc:sldChg>
+      <pc:sldChg chg="addSp delSp modSp new mod">
+        <pc:chgData name="Leo Avalos" userId="bf84d2b012f92406" providerId="LiveId" clId="{4DD8F824-29E6-4CBB-8D63-62D3BB649C5E}" dt="2025-05-04T00:47:24.559" v="334" actId="20577"/>
+        <pc:sldMkLst>
+          <pc:docMk/>
+          <pc:sldMk cId="545857240" sldId="258"/>
+        </pc:sldMkLst>
+        <pc:spChg chg="del">
+          <ac:chgData name="Leo Avalos" userId="bf84d2b012f92406" providerId="LiveId" clId="{4DD8F824-29E6-4CBB-8D63-62D3BB649C5E}" dt="2025-05-04T00:39:42.411" v="110" actId="478"/>
+          <ac:spMkLst>
+            <pc:docMk/>
+            <pc:sldMk cId="545857240" sldId="258"/>
+            <ac:spMk id="2" creationId="{71F30B72-19BF-1C20-E57B-F015E1402DEC}"/>
+          </ac:spMkLst>
+        </pc:spChg>
+        <pc:spChg chg="del">
+          <ac:chgData name="Leo Avalos" userId="bf84d2b012f92406" providerId="LiveId" clId="{4DD8F824-29E6-4CBB-8D63-62D3BB649C5E}" dt="2025-05-04T00:39:40.986" v="109" actId="478"/>
+          <ac:spMkLst>
+            <pc:docMk/>
+            <pc:sldMk cId="545857240" sldId="258"/>
+            <ac:spMk id="3" creationId="{60E5DDA4-AD1F-C707-0549-94FC6C7949A6}"/>
+          </ac:spMkLst>
+        </pc:spChg>
+        <pc:spChg chg="add mod">
+          <ac:chgData name="Leo Avalos" userId="bf84d2b012f92406" providerId="LiveId" clId="{4DD8F824-29E6-4CBB-8D63-62D3BB649C5E}" dt="2025-05-04T00:39:48.071" v="112" actId="164"/>
+          <ac:spMkLst>
+            <pc:docMk/>
+            <pc:sldMk cId="545857240" sldId="258"/>
+            <ac:spMk id="4" creationId="{A2730AC7-F156-B7DE-E1BC-741FA8B74131}"/>
+          </ac:spMkLst>
+        </pc:spChg>
+        <pc:spChg chg="add mod">
+          <ac:chgData name="Leo Avalos" userId="bf84d2b012f92406" providerId="LiveId" clId="{4DD8F824-29E6-4CBB-8D63-62D3BB649C5E}" dt="2025-05-04T00:39:48.071" v="112" actId="164"/>
+          <ac:spMkLst>
+            <pc:docMk/>
+            <pc:sldMk cId="545857240" sldId="258"/>
+            <ac:spMk id="5" creationId="{580E63AF-39FC-B41F-57DD-C9BC88C91414}"/>
+          </ac:spMkLst>
+        </pc:spChg>
+        <pc:spChg chg="add mod">
+          <ac:chgData name="Leo Avalos" userId="bf84d2b012f92406" providerId="LiveId" clId="{4DD8F824-29E6-4CBB-8D63-62D3BB649C5E}" dt="2025-05-04T00:40:54.355" v="129" actId="1076"/>
+          <ac:spMkLst>
+            <pc:docMk/>
+            <pc:sldMk cId="545857240" sldId="258"/>
+            <ac:spMk id="7" creationId="{2F9CDB7F-4E35-CE15-0ED5-9B620734DA12}"/>
+          </ac:spMkLst>
+        </pc:spChg>
+        <pc:spChg chg="add mod">
+          <ac:chgData name="Leo Avalos" userId="bf84d2b012f92406" providerId="LiveId" clId="{4DD8F824-29E6-4CBB-8D63-62D3BB649C5E}" dt="2025-05-04T00:47:12.592" v="313" actId="20577"/>
+          <ac:spMkLst>
+            <pc:docMk/>
+            <pc:sldMk cId="545857240" sldId="258"/>
+            <ac:spMk id="8" creationId="{E8F333BD-30ED-6662-3A77-1D944A17E066}"/>
+          </ac:spMkLst>
+        </pc:spChg>
+        <pc:spChg chg="add mod">
+          <ac:chgData name="Leo Avalos" userId="bf84d2b012f92406" providerId="LiveId" clId="{4DD8F824-29E6-4CBB-8D63-62D3BB649C5E}" dt="2025-05-04T00:41:50.801" v="149" actId="1076"/>
+          <ac:spMkLst>
+            <pc:docMk/>
+            <pc:sldMk cId="545857240" sldId="258"/>
+            <ac:spMk id="9" creationId="{8370E968-7114-FDC6-F443-18364625491A}"/>
+          </ac:spMkLst>
+        </pc:spChg>
+        <pc:spChg chg="add mod">
+          <ac:chgData name="Leo Avalos" userId="bf84d2b012f92406" providerId="LiveId" clId="{4DD8F824-29E6-4CBB-8D63-62D3BB649C5E}" dt="2025-05-04T00:43:01.449" v="193" actId="207"/>
+          <ac:spMkLst>
+            <pc:docMk/>
+            <pc:sldMk cId="545857240" sldId="258"/>
+            <ac:spMk id="10" creationId="{2CC8D39B-7AC5-5501-B696-B4BAE3C55DDD}"/>
+          </ac:spMkLst>
+        </pc:spChg>
+        <pc:spChg chg="add del">
+          <ac:chgData name="Leo Avalos" userId="bf84d2b012f92406" providerId="LiveId" clId="{4DD8F824-29E6-4CBB-8D63-62D3BB649C5E}" dt="2025-05-04T00:41:11.497" v="135" actId="11529"/>
+          <ac:spMkLst>
+            <pc:docMk/>
+            <pc:sldMk cId="545857240" sldId="258"/>
+            <ac:spMk id="11" creationId="{B15C680B-424E-1FC1-5B14-21AB3D7E4491}"/>
+          </ac:spMkLst>
+        </pc:spChg>
+        <pc:spChg chg="add mod">
+          <ac:chgData name="Leo Avalos" userId="bf84d2b012f92406" providerId="LiveId" clId="{4DD8F824-29E6-4CBB-8D63-62D3BB649C5E}" dt="2025-05-04T00:43:23.285" v="196" actId="1076"/>
+          <ac:spMkLst>
+            <pc:docMk/>
+            <pc:sldMk cId="545857240" sldId="258"/>
+            <ac:spMk id="12" creationId="{54F6A480-48DA-BE2D-A8A8-A98FF66FEBA9}"/>
+          </ac:spMkLst>
+        </pc:spChg>
+        <pc:spChg chg="add del mod">
+          <ac:chgData name="Leo Avalos" userId="bf84d2b012f92406" providerId="LiveId" clId="{4DD8F824-29E6-4CBB-8D63-62D3BB649C5E}" dt="2025-05-04T00:42:22.760" v="176" actId="478"/>
+          <ac:spMkLst>
+            <pc:docMk/>
+            <pc:sldMk cId="545857240" sldId="258"/>
+            <ac:spMk id="13" creationId="{1980493F-C5B6-119B-F9E9-C3A5DAD96C6F}"/>
+          </ac:spMkLst>
+        </pc:spChg>
+        <pc:spChg chg="add del mod">
+          <ac:chgData name="Leo Avalos" userId="bf84d2b012f92406" providerId="LiveId" clId="{4DD8F824-29E6-4CBB-8D63-62D3BB649C5E}" dt="2025-05-04T00:42:24.696" v="177" actId="478"/>
+          <ac:spMkLst>
+            <pc:docMk/>
+            <pc:sldMk cId="545857240" sldId="258"/>
+            <ac:spMk id="14" creationId="{3B526B40-47BC-34ED-DF79-D92F640C202C}"/>
+          </ac:spMkLst>
+        </pc:spChg>
+        <pc:spChg chg="add mod">
+          <ac:chgData name="Leo Avalos" userId="bf84d2b012f92406" providerId="LiveId" clId="{4DD8F824-29E6-4CBB-8D63-62D3BB649C5E}" dt="2025-05-04T00:42:11.447" v="171" actId="1076"/>
+          <ac:spMkLst>
+            <pc:docMk/>
+            <pc:sldMk cId="545857240" sldId="258"/>
+            <ac:spMk id="15" creationId="{7E6CAEAF-6EA5-ACDA-48D8-DC5C125527D0}"/>
+          </ac:spMkLst>
+        </pc:spChg>
+        <pc:spChg chg="add mod">
+          <ac:chgData name="Leo Avalos" userId="bf84d2b012f92406" providerId="LiveId" clId="{4DD8F824-29E6-4CBB-8D63-62D3BB649C5E}" dt="2025-05-04T00:47:16.504" v="319" actId="20577"/>
+          <ac:spMkLst>
+            <pc:docMk/>
+            <pc:sldMk cId="545857240" sldId="258"/>
+            <ac:spMk id="16" creationId="{0C344BB8-4FFB-CF52-D5F9-D92203CDA588}"/>
+          </ac:spMkLst>
+        </pc:spChg>
+        <pc:spChg chg="add mod">
+          <ac:chgData name="Leo Avalos" userId="bf84d2b012f92406" providerId="LiveId" clId="{4DD8F824-29E6-4CBB-8D63-62D3BB649C5E}" dt="2025-05-04T00:42:43.271" v="190" actId="20577"/>
+          <ac:spMkLst>
+            <pc:docMk/>
+            <pc:sldMk cId="545857240" sldId="258"/>
+            <ac:spMk id="17" creationId="{9A4447A8-150B-8306-B8FD-AF63A5735252}"/>
+          </ac:spMkLst>
+        </pc:spChg>
+        <pc:spChg chg="add mod">
+          <ac:chgData name="Leo Avalos" userId="bf84d2b012f92406" providerId="LiveId" clId="{4DD8F824-29E6-4CBB-8D63-62D3BB649C5E}" dt="2025-05-04T00:47:22.047" v="328" actId="20577"/>
+          <ac:spMkLst>
+            <pc:docMk/>
+            <pc:sldMk cId="545857240" sldId="258"/>
+            <ac:spMk id="18" creationId="{8FC2CE6C-4C61-113C-5F18-AB6FF711806F}"/>
+          </ac:spMkLst>
+        </pc:spChg>
+        <pc:spChg chg="add mod">
+          <ac:chgData name="Leo Avalos" userId="bf84d2b012f92406" providerId="LiveId" clId="{4DD8F824-29E6-4CBB-8D63-62D3BB649C5E}" dt="2025-05-04T00:47:24.559" v="334" actId="20577"/>
+          <ac:spMkLst>
+            <pc:docMk/>
+            <pc:sldMk cId="545857240" sldId="258"/>
+            <ac:spMk id="19" creationId="{36E0E86F-02FE-90E7-DDBB-316A12044970}"/>
+          </ac:spMkLst>
+        </pc:spChg>
+        <pc:spChg chg="add mod">
+          <ac:chgData name="Leo Avalos" userId="bf84d2b012f92406" providerId="LiveId" clId="{4DD8F824-29E6-4CBB-8D63-62D3BB649C5E}" dt="2025-05-04T00:43:59.303" v="204" actId="20577"/>
+          <ac:spMkLst>
+            <pc:docMk/>
+            <pc:sldMk cId="545857240" sldId="258"/>
+            <ac:spMk id="20" creationId="{28DB1A85-0C5F-DEA8-7CF5-3FCDACE98A40}"/>
+          </ac:spMkLst>
+        </pc:spChg>
+        <pc:spChg chg="add mod">
+          <ac:chgData name="Leo Avalos" userId="bf84d2b012f92406" providerId="LiveId" clId="{4DD8F824-29E6-4CBB-8D63-62D3BB649C5E}" dt="2025-05-04T00:44:02.747" v="210" actId="20577"/>
+          <ac:spMkLst>
+            <pc:docMk/>
+            <pc:sldMk cId="545857240" sldId="258"/>
+            <ac:spMk id="21" creationId="{B7248590-DA26-B0E6-213A-81F0DCEE4548}"/>
+          </ac:spMkLst>
+        </pc:spChg>
+        <pc:spChg chg="add mod">
+          <ac:chgData name="Leo Avalos" userId="bf84d2b012f92406" providerId="LiveId" clId="{4DD8F824-29E6-4CBB-8D63-62D3BB649C5E}" dt="2025-05-04T00:44:26.468" v="227" actId="14100"/>
+          <ac:spMkLst>
+            <pc:docMk/>
+            <pc:sldMk cId="545857240" sldId="258"/>
+            <ac:spMk id="22" creationId="{9B8FE751-CD98-771D-9B09-6EEDC6C4B57D}"/>
+          </ac:spMkLst>
+        </pc:spChg>
+        <pc:spChg chg="add mod">
+          <ac:chgData name="Leo Avalos" userId="bf84d2b012f92406" providerId="LiveId" clId="{4DD8F824-29E6-4CBB-8D63-62D3BB649C5E}" dt="2025-05-04T00:44:34.702" v="233" actId="20577"/>
+          <ac:spMkLst>
+            <pc:docMk/>
+            <pc:sldMk cId="545857240" sldId="258"/>
+            <ac:spMk id="23" creationId="{91DB350C-B9E6-2A0F-6BAE-4EDC2F30F9B4}"/>
+          </ac:spMkLst>
+        </pc:spChg>
+        <pc:spChg chg="add mod">
+          <ac:chgData name="Leo Avalos" userId="bf84d2b012f92406" providerId="LiveId" clId="{4DD8F824-29E6-4CBB-8D63-62D3BB649C5E}" dt="2025-05-04T00:45:04.232" v="249" actId="20577"/>
+          <ac:spMkLst>
+            <pc:docMk/>
+            <pc:sldMk cId="545857240" sldId="258"/>
+            <ac:spMk id="24" creationId="{F1EB7353-C92D-51F1-6BB4-00621E8255C0}"/>
+          </ac:spMkLst>
+        </pc:spChg>
+        <pc:spChg chg="add mod">
+          <ac:chgData name="Leo Avalos" userId="bf84d2b012f92406" providerId="LiveId" clId="{4DD8F824-29E6-4CBB-8D63-62D3BB649C5E}" dt="2025-05-04T00:45:10.751" v="263" actId="20577"/>
+          <ac:spMkLst>
+            <pc:docMk/>
+            <pc:sldMk cId="545857240" sldId="258"/>
+            <ac:spMk id="25" creationId="{CEFEA687-A50B-B63D-2819-CEC3C55AA4F1}"/>
+          </ac:spMkLst>
+        </pc:spChg>
+        <pc:spChg chg="add mod">
+          <ac:chgData name="Leo Avalos" userId="bf84d2b012f92406" providerId="LiveId" clId="{4DD8F824-29E6-4CBB-8D63-62D3BB649C5E}" dt="2025-05-04T00:45:46.768" v="269" actId="20577"/>
+          <ac:spMkLst>
+            <pc:docMk/>
+            <pc:sldMk cId="545857240" sldId="258"/>
+            <ac:spMk id="26" creationId="{A4A84DF1-9F8D-A0D9-31D9-88F3650CB863}"/>
+          </ac:spMkLst>
+        </pc:spChg>
+        <pc:spChg chg="add mod">
+          <ac:chgData name="Leo Avalos" userId="bf84d2b012f92406" providerId="LiveId" clId="{4DD8F824-29E6-4CBB-8D63-62D3BB649C5E}" dt="2025-05-04T00:46:02.131" v="279" actId="20577"/>
+          <ac:spMkLst>
+            <pc:docMk/>
+            <pc:sldMk cId="545857240" sldId="258"/>
+            <ac:spMk id="27" creationId="{929E166E-FAF6-0007-6C0B-CA0E61B5E469}"/>
+          </ac:spMkLst>
+        </pc:spChg>
+        <pc:spChg chg="add mod">
+          <ac:chgData name="Leo Avalos" userId="bf84d2b012f92406" providerId="LiveId" clId="{4DD8F824-29E6-4CBB-8D63-62D3BB649C5E}" dt="2025-05-04T00:46:16.388" v="282" actId="1076"/>
+          <ac:spMkLst>
+            <pc:docMk/>
+            <pc:sldMk cId="545857240" sldId="258"/>
+            <ac:spMk id="28" creationId="{590A1BEA-4B17-EE29-84D3-613AC0A4846E}"/>
+          </ac:spMkLst>
+        </pc:spChg>
+        <pc:spChg chg="add mod">
+          <ac:chgData name="Leo Avalos" userId="bf84d2b012f92406" providerId="LiveId" clId="{4DD8F824-29E6-4CBB-8D63-62D3BB649C5E}" dt="2025-05-04T00:46:57.980" v="300" actId="14100"/>
+          <ac:spMkLst>
+            <pc:docMk/>
+            <pc:sldMk cId="545857240" sldId="258"/>
+            <ac:spMk id="29" creationId="{9A3C10F0-63DA-86BD-FFCA-589A9B90B281}"/>
+          </ac:spMkLst>
+        </pc:spChg>
+        <pc:spChg chg="add mod">
+          <ac:chgData name="Leo Avalos" userId="bf84d2b012f92406" providerId="LiveId" clId="{4DD8F824-29E6-4CBB-8D63-62D3BB649C5E}" dt="2025-05-04T00:46:56.235" v="299" actId="14100"/>
+          <ac:spMkLst>
+            <pc:docMk/>
+            <pc:sldMk cId="545857240" sldId="258"/>
+            <ac:spMk id="30" creationId="{1E9353AF-0A17-F5C7-FF2A-95B5F4C6F85C}"/>
+          </ac:spMkLst>
+        </pc:spChg>
+        <pc:spChg chg="add mod">
+          <ac:chgData name="Leo Avalos" userId="bf84d2b012f92406" providerId="LiveId" clId="{4DD8F824-29E6-4CBB-8D63-62D3BB649C5E}" dt="2025-05-04T00:47:02.042" v="307" actId="20577"/>
+          <ac:spMkLst>
+            <pc:docMk/>
+            <pc:sldMk cId="545857240" sldId="258"/>
+            <ac:spMk id="31" creationId="{1F0FC2A3-FD1F-4680-4CA9-D91D4F27C37A}"/>
+          </ac:spMkLst>
+        </pc:spChg>
+        <pc:spChg chg="add mod">
+          <ac:chgData name="Leo Avalos" userId="bf84d2b012f92406" providerId="LiveId" clId="{4DD8F824-29E6-4CBB-8D63-62D3BB649C5E}" dt="2025-05-04T00:47:06.355" v="310" actId="20577"/>
+          <ac:spMkLst>
+            <pc:docMk/>
+            <pc:sldMk cId="545857240" sldId="258"/>
+            <ac:spMk id="32" creationId="{B6F7253B-3EA6-CD9A-C383-A3AB937B0A60}"/>
+          </ac:spMkLst>
+        </pc:spChg>
+        <pc:spChg chg="add mod">
+          <ac:chgData name="Leo Avalos" userId="bf84d2b012f92406" providerId="LiveId" clId="{4DD8F824-29E6-4CBB-8D63-62D3BB649C5E}" dt="2025-05-04T00:46:29.100" v="284" actId="1076"/>
+          <ac:spMkLst>
+            <pc:docMk/>
+            <pc:sldMk cId="545857240" sldId="258"/>
+            <ac:spMk id="33" creationId="{98380371-EA4B-65D3-DB23-2CB98CF3B2CE}"/>
+          </ac:spMkLst>
+        </pc:spChg>
+        <pc:grpChg chg="add mod">
+          <ac:chgData name="Leo Avalos" userId="bf84d2b012f92406" providerId="LiveId" clId="{4DD8F824-29E6-4CBB-8D63-62D3BB649C5E}" dt="2025-05-04T00:40:51.394" v="128" actId="1076"/>
+          <ac:grpSpMkLst>
+            <pc:docMk/>
+            <pc:sldMk cId="545857240" sldId="258"/>
+            <ac:grpSpMk id="6" creationId="{0D3500AA-981A-2E7C-7B7C-E3587EE58D71}"/>
+          </ac:grpSpMkLst>
+        </pc:grpChg>
+      </pc:sldChg>
+    </pc:docChg>
+  </pc:docChgLst>
+</pc:chgInfo>
 </file>
 
 <file path=ppt/slideLayouts/slideLayout1.xml><?xml version="1.0" encoding="utf-8"?>
@@ -256,7 +643,7 @@
           <a:p>
             <a:fld id="{A86DD931-603D-4258-B735-6B59C1AD3FE1}" type="datetimeFigureOut">
               <a:rPr lang="es-MX" smtClean="0"/>
-              <a:t>26/04/2025</a:t>
+              <a:t>03/05/2025</a:t>
             </a:fld>
             <a:endParaRPr lang="es-MX"/>
           </a:p>
@@ -456,7 +843,7 @@
           <a:p>
             <a:fld id="{A86DD931-603D-4258-B735-6B59C1AD3FE1}" type="datetimeFigureOut">
               <a:rPr lang="es-MX" smtClean="0"/>
-              <a:t>26/04/2025</a:t>
+              <a:t>03/05/2025</a:t>
             </a:fld>
             <a:endParaRPr lang="es-MX"/>
           </a:p>
@@ -666,7 +1053,7 @@
           <a:p>
             <a:fld id="{A86DD931-603D-4258-B735-6B59C1AD3FE1}" type="datetimeFigureOut">
               <a:rPr lang="es-MX" smtClean="0"/>
-              <a:t>26/04/2025</a:t>
+              <a:t>03/05/2025</a:t>
             </a:fld>
             <a:endParaRPr lang="es-MX"/>
           </a:p>
@@ -866,7 +1253,7 @@
           <a:p>
             <a:fld id="{A86DD931-603D-4258-B735-6B59C1AD3FE1}" type="datetimeFigureOut">
               <a:rPr lang="es-MX" smtClean="0"/>
-              <a:t>26/04/2025</a:t>
+              <a:t>03/05/2025</a:t>
             </a:fld>
             <a:endParaRPr lang="es-MX"/>
           </a:p>
@@ -1142,7 +1529,7 @@
           <a:p>
             <a:fld id="{A86DD931-603D-4258-B735-6B59C1AD3FE1}" type="datetimeFigureOut">
               <a:rPr lang="es-MX" smtClean="0"/>
-              <a:t>26/04/2025</a:t>
+              <a:t>03/05/2025</a:t>
             </a:fld>
             <a:endParaRPr lang="es-MX"/>
           </a:p>
@@ -1410,7 +1797,7 @@
           <a:p>
             <a:fld id="{A86DD931-603D-4258-B735-6B59C1AD3FE1}" type="datetimeFigureOut">
               <a:rPr lang="es-MX" smtClean="0"/>
-              <a:t>26/04/2025</a:t>
+              <a:t>03/05/2025</a:t>
             </a:fld>
             <a:endParaRPr lang="es-MX"/>
           </a:p>
@@ -1825,7 +2212,7 @@
           <a:p>
             <a:fld id="{A86DD931-603D-4258-B735-6B59C1AD3FE1}" type="datetimeFigureOut">
               <a:rPr lang="es-MX" smtClean="0"/>
-              <a:t>26/04/2025</a:t>
+              <a:t>03/05/2025</a:t>
             </a:fld>
             <a:endParaRPr lang="es-MX"/>
           </a:p>
@@ -1967,7 +2354,7 @@
           <a:p>
             <a:fld id="{A86DD931-603D-4258-B735-6B59C1AD3FE1}" type="datetimeFigureOut">
               <a:rPr lang="es-MX" smtClean="0"/>
-              <a:t>26/04/2025</a:t>
+              <a:t>03/05/2025</a:t>
             </a:fld>
             <a:endParaRPr lang="es-MX"/>
           </a:p>
@@ -2080,7 +2467,7 @@
           <a:p>
             <a:fld id="{A86DD931-603D-4258-B735-6B59C1AD3FE1}" type="datetimeFigureOut">
               <a:rPr lang="es-MX" smtClean="0"/>
-              <a:t>26/04/2025</a:t>
+              <a:t>03/05/2025</a:t>
             </a:fld>
             <a:endParaRPr lang="es-MX"/>
           </a:p>
@@ -2393,7 +2780,7 @@
           <a:p>
             <a:fld id="{A86DD931-603D-4258-B735-6B59C1AD3FE1}" type="datetimeFigureOut">
               <a:rPr lang="es-MX" smtClean="0"/>
-              <a:t>26/04/2025</a:t>
+              <a:t>03/05/2025</a:t>
             </a:fld>
             <a:endParaRPr lang="es-MX"/>
           </a:p>
@@ -2682,7 +3069,7 @@
           <a:p>
             <a:fld id="{A86DD931-603D-4258-B735-6B59C1AD3FE1}" type="datetimeFigureOut">
               <a:rPr lang="es-MX" smtClean="0"/>
-              <a:t>26/04/2025</a:t>
+              <a:t>03/05/2025</a:t>
             </a:fld>
             <a:endParaRPr lang="es-MX"/>
           </a:p>
@@ -2925,7 +3312,7 @@
           <a:p>
             <a:fld id="{A86DD931-603D-4258-B735-6B59C1AD3FE1}" type="datetimeFigureOut">
               <a:rPr lang="es-MX" smtClean="0"/>
-              <a:t>26/04/2025</a:t>
+              <a:t>03/05/2025</a:t>
             </a:fld>
             <a:endParaRPr lang="es-MX"/>
           </a:p>
@@ -3945,6 +4332,1918 @@
 </p:sld>
 </file>
 
+<file path=ppt/slides/slide2.xml><?xml version="1.0" encoding="utf-8"?>
+<p:sld xmlns:a="http://schemas.openxmlformats.org/drawingml/2006/main" xmlns:r="http://schemas.openxmlformats.org/officeDocument/2006/relationships" xmlns:p="http://schemas.openxmlformats.org/presentationml/2006/main">
+  <p:cSld>
+    <p:spTree>
+      <p:nvGrpSpPr>
+        <p:cNvPr id="1" name=""/>
+        <p:cNvGrpSpPr/>
+        <p:nvPr/>
+      </p:nvGrpSpPr>
+      <p:grpSpPr>
+        <a:xfrm>
+          <a:off x="0" y="0"/>
+          <a:ext cx="0" cy="0"/>
+          <a:chOff x="0" y="0"/>
+          <a:chExt cx="0" cy="0"/>
+        </a:xfrm>
+      </p:grpSpPr>
+      <p:sp>
+        <p:nvSpPr>
+          <p:cNvPr id="4" name="Rectángulo 3">
+            <a:extLst>
+              <a:ext uri="{FF2B5EF4-FFF2-40B4-BE49-F238E27FC236}">
+                <a16:creationId xmlns:a16="http://schemas.microsoft.com/office/drawing/2014/main" id="{903B948E-62B4-5435-AC7C-F04055CB9C86}"/>
+              </a:ext>
+            </a:extLst>
+          </p:cNvPr>
+          <p:cNvSpPr/>
+          <p:nvPr/>
+        </p:nvSpPr>
+        <p:spPr>
+          <a:xfrm>
+            <a:off x="3234519" y="614149"/>
+            <a:ext cx="2251881" cy="5131558"/>
+          </a:xfrm>
+          <a:prstGeom prst="rect">
+            <a:avLst/>
+          </a:prstGeom>
+          <a:solidFill>
+            <a:schemeClr val="bg1"/>
+          </a:solidFill>
+        </p:spPr>
+        <p:style>
+          <a:lnRef idx="2">
+            <a:schemeClr val="accent1">
+              <a:shade val="15000"/>
+            </a:schemeClr>
+          </a:lnRef>
+          <a:fillRef idx="1">
+            <a:schemeClr val="accent1"/>
+          </a:fillRef>
+          <a:effectRef idx="0">
+            <a:schemeClr val="accent1"/>
+          </a:effectRef>
+          <a:fontRef idx="minor">
+            <a:schemeClr val="lt1"/>
+          </a:fontRef>
+        </p:style>
+        <p:txBody>
+          <a:bodyPr rtlCol="0" anchor="ctr"/>
+          <a:lstStyle/>
+          <a:p>
+            <a:pPr algn="ctr"/>
+            <a:endParaRPr lang="es-MX" dirty="0"/>
+          </a:p>
+        </p:txBody>
+      </p:sp>
+      <p:sp>
+        <p:nvSpPr>
+          <p:cNvPr id="5" name="Rectángulo 4">
+            <a:extLst>
+              <a:ext uri="{FF2B5EF4-FFF2-40B4-BE49-F238E27FC236}">
+                <a16:creationId xmlns:a16="http://schemas.microsoft.com/office/drawing/2014/main" id="{5CB0EE3B-A594-B3FB-AAFA-07C73F2CEBBB}"/>
+              </a:ext>
+            </a:extLst>
+          </p:cNvPr>
+          <p:cNvSpPr/>
+          <p:nvPr/>
+        </p:nvSpPr>
+        <p:spPr>
+          <a:xfrm>
+            <a:off x="3234519" y="614149"/>
+            <a:ext cx="2251881" cy="286603"/>
+          </a:xfrm>
+          <a:prstGeom prst="rect">
+            <a:avLst/>
+          </a:prstGeom>
+        </p:spPr>
+        <p:style>
+          <a:lnRef idx="2">
+            <a:schemeClr val="accent1">
+              <a:shade val="15000"/>
+            </a:schemeClr>
+          </a:lnRef>
+          <a:fillRef idx="1">
+            <a:schemeClr val="accent1"/>
+          </a:fillRef>
+          <a:effectRef idx="0">
+            <a:schemeClr val="accent1"/>
+          </a:effectRef>
+          <a:fontRef idx="minor">
+            <a:schemeClr val="lt1"/>
+          </a:fontRef>
+        </p:style>
+        <p:txBody>
+          <a:bodyPr rtlCol="0" anchor="ctr"/>
+          <a:lstStyle/>
+          <a:p>
+            <a:pPr algn="ctr"/>
+            <a:endParaRPr lang="es-MX"/>
+          </a:p>
+        </p:txBody>
+      </p:sp>
+      <p:sp>
+        <p:nvSpPr>
+          <p:cNvPr id="6" name="CuadroTexto 5">
+            <a:extLst>
+              <a:ext uri="{FF2B5EF4-FFF2-40B4-BE49-F238E27FC236}">
+                <a16:creationId xmlns:a16="http://schemas.microsoft.com/office/drawing/2014/main" id="{F5A3B549-5FC4-16CF-79EA-2FA2472DAEBF}"/>
+              </a:ext>
+            </a:extLst>
+          </p:cNvPr>
+          <p:cNvSpPr txBox="1"/>
+          <p:nvPr/>
+        </p:nvSpPr>
+        <p:spPr>
+          <a:xfrm>
+            <a:off x="3384644" y="1112293"/>
+            <a:ext cx="1499321" cy="369332"/>
+          </a:xfrm>
+          <a:prstGeom prst="rect">
+            <a:avLst/>
+          </a:prstGeom>
+          <a:noFill/>
+        </p:spPr>
+        <p:txBody>
+          <a:bodyPr wrap="none" rtlCol="0">
+            <a:spAutoFit/>
+          </a:bodyPr>
+          <a:lstStyle/>
+          <a:p>
+            <a:r>
+              <a:rPr lang="es-MX" dirty="0"/>
+              <a:t>Cores </a:t>
+            </a:r>
+            <a:r>
+              <a:rPr lang="es-MX" dirty="0" err="1"/>
+              <a:t>Afinnity</a:t>
+            </a:r>
+            <a:endParaRPr lang="es-MX" dirty="0"/>
+          </a:p>
+        </p:txBody>
+      </p:sp>
+      <p:sp>
+        <p:nvSpPr>
+          <p:cNvPr id="7" name="Rectángulo 6">
+            <a:extLst>
+              <a:ext uri="{FF2B5EF4-FFF2-40B4-BE49-F238E27FC236}">
+                <a16:creationId xmlns:a16="http://schemas.microsoft.com/office/drawing/2014/main" id="{49723FF6-9801-2761-67A8-49CD118A37EC}"/>
+              </a:ext>
+            </a:extLst>
+          </p:cNvPr>
+          <p:cNvSpPr/>
+          <p:nvPr/>
+        </p:nvSpPr>
+        <p:spPr>
+          <a:xfrm>
+            <a:off x="3562368" y="1481625"/>
+            <a:ext cx="204716" cy="211541"/>
+          </a:xfrm>
+          <a:prstGeom prst="rect">
+            <a:avLst/>
+          </a:prstGeom>
+          <a:solidFill>
+            <a:schemeClr val="bg1"/>
+          </a:solidFill>
+        </p:spPr>
+        <p:style>
+          <a:lnRef idx="2">
+            <a:schemeClr val="accent1">
+              <a:shade val="15000"/>
+            </a:schemeClr>
+          </a:lnRef>
+          <a:fillRef idx="1">
+            <a:schemeClr val="accent1"/>
+          </a:fillRef>
+          <a:effectRef idx="0">
+            <a:schemeClr val="accent1"/>
+          </a:effectRef>
+          <a:fontRef idx="minor">
+            <a:schemeClr val="lt1"/>
+          </a:fontRef>
+        </p:style>
+        <p:txBody>
+          <a:bodyPr rtlCol="0" anchor="ctr"/>
+          <a:lstStyle/>
+          <a:p>
+            <a:pPr algn="ctr"/>
+            <a:endParaRPr lang="es-MX"/>
+          </a:p>
+        </p:txBody>
+      </p:sp>
+      <p:sp>
+        <p:nvSpPr>
+          <p:cNvPr id="8" name="CuadroTexto 7">
+            <a:extLst>
+              <a:ext uri="{FF2B5EF4-FFF2-40B4-BE49-F238E27FC236}">
+                <a16:creationId xmlns:a16="http://schemas.microsoft.com/office/drawing/2014/main" id="{40FF574B-7DA3-FB45-1127-26056E65F011}"/>
+              </a:ext>
+            </a:extLst>
+          </p:cNvPr>
+          <p:cNvSpPr txBox="1"/>
+          <p:nvPr/>
+        </p:nvSpPr>
+        <p:spPr>
+          <a:xfrm>
+            <a:off x="3777301" y="1402730"/>
+            <a:ext cx="513282" cy="369332"/>
+          </a:xfrm>
+          <a:prstGeom prst="rect">
+            <a:avLst/>
+          </a:prstGeom>
+          <a:noFill/>
+        </p:spPr>
+        <p:txBody>
+          <a:bodyPr wrap="none" rtlCol="0">
+            <a:spAutoFit/>
+          </a:bodyPr>
+          <a:lstStyle/>
+          <a:p>
+            <a:r>
+              <a:rPr lang="es-MX" dirty="0"/>
+              <a:t>ALL</a:t>
+            </a:r>
+          </a:p>
+        </p:txBody>
+      </p:sp>
+      <p:sp>
+        <p:nvSpPr>
+          <p:cNvPr id="9" name="Rectángulo 8">
+            <a:extLst>
+              <a:ext uri="{FF2B5EF4-FFF2-40B4-BE49-F238E27FC236}">
+                <a16:creationId xmlns:a16="http://schemas.microsoft.com/office/drawing/2014/main" id="{7A12CA7F-6869-DB88-ABAC-4B7981DD870C}"/>
+              </a:ext>
+            </a:extLst>
+          </p:cNvPr>
+          <p:cNvSpPr/>
+          <p:nvPr/>
+        </p:nvSpPr>
+        <p:spPr>
+          <a:xfrm>
+            <a:off x="3567400" y="1811087"/>
+            <a:ext cx="204716" cy="211541"/>
+          </a:xfrm>
+          <a:prstGeom prst="rect">
+            <a:avLst/>
+          </a:prstGeom>
+          <a:solidFill>
+            <a:schemeClr val="bg1"/>
+          </a:solidFill>
+        </p:spPr>
+        <p:style>
+          <a:lnRef idx="2">
+            <a:schemeClr val="accent1">
+              <a:shade val="15000"/>
+            </a:schemeClr>
+          </a:lnRef>
+          <a:fillRef idx="1">
+            <a:schemeClr val="accent1"/>
+          </a:fillRef>
+          <a:effectRef idx="0">
+            <a:schemeClr val="accent1"/>
+          </a:effectRef>
+          <a:fontRef idx="minor">
+            <a:schemeClr val="lt1"/>
+          </a:fontRef>
+        </p:style>
+        <p:txBody>
+          <a:bodyPr rtlCol="0" anchor="ctr"/>
+          <a:lstStyle/>
+          <a:p>
+            <a:pPr algn="ctr"/>
+            <a:endParaRPr lang="es-MX"/>
+          </a:p>
+        </p:txBody>
+      </p:sp>
+      <p:sp>
+        <p:nvSpPr>
+          <p:cNvPr id="11" name="CuadroTexto 10">
+            <a:extLst>
+              <a:ext uri="{FF2B5EF4-FFF2-40B4-BE49-F238E27FC236}">
+                <a16:creationId xmlns:a16="http://schemas.microsoft.com/office/drawing/2014/main" id="{C4DE9291-9EDE-22F1-6DD5-92955654E89C}"/>
+              </a:ext>
+            </a:extLst>
+          </p:cNvPr>
+          <p:cNvSpPr txBox="1"/>
+          <p:nvPr/>
+        </p:nvSpPr>
+        <p:spPr>
+          <a:xfrm>
+            <a:off x="3793965" y="1732191"/>
+            <a:ext cx="301686" cy="369332"/>
+          </a:xfrm>
+          <a:prstGeom prst="rect">
+            <a:avLst/>
+          </a:prstGeom>
+          <a:noFill/>
+        </p:spPr>
+        <p:txBody>
+          <a:bodyPr wrap="none" rtlCol="0">
+            <a:spAutoFit/>
+          </a:bodyPr>
+          <a:lstStyle/>
+          <a:p>
+            <a:r>
+              <a:rPr lang="es-MX" dirty="0"/>
+              <a:t>0</a:t>
+            </a:r>
+          </a:p>
+        </p:txBody>
+      </p:sp>
+      <p:sp>
+        <p:nvSpPr>
+          <p:cNvPr id="12" name="Rectángulo 11">
+            <a:extLst>
+              <a:ext uri="{FF2B5EF4-FFF2-40B4-BE49-F238E27FC236}">
+                <a16:creationId xmlns:a16="http://schemas.microsoft.com/office/drawing/2014/main" id="{D46B4974-1910-C590-B749-60B2E757A778}"/>
+              </a:ext>
+            </a:extLst>
+          </p:cNvPr>
+          <p:cNvSpPr/>
+          <p:nvPr/>
+        </p:nvSpPr>
+        <p:spPr>
+          <a:xfrm>
+            <a:off x="3567400" y="2101524"/>
+            <a:ext cx="204716" cy="211541"/>
+          </a:xfrm>
+          <a:prstGeom prst="rect">
+            <a:avLst/>
+          </a:prstGeom>
+          <a:solidFill>
+            <a:schemeClr val="bg1"/>
+          </a:solidFill>
+        </p:spPr>
+        <p:style>
+          <a:lnRef idx="2">
+            <a:schemeClr val="accent1">
+              <a:shade val="15000"/>
+            </a:schemeClr>
+          </a:lnRef>
+          <a:fillRef idx="1">
+            <a:schemeClr val="accent1"/>
+          </a:fillRef>
+          <a:effectRef idx="0">
+            <a:schemeClr val="accent1"/>
+          </a:effectRef>
+          <a:fontRef idx="minor">
+            <a:schemeClr val="lt1"/>
+          </a:fontRef>
+        </p:style>
+        <p:txBody>
+          <a:bodyPr rtlCol="0" anchor="ctr"/>
+          <a:lstStyle/>
+          <a:p>
+            <a:pPr algn="ctr"/>
+            <a:endParaRPr lang="es-MX"/>
+          </a:p>
+        </p:txBody>
+      </p:sp>
+      <p:sp>
+        <p:nvSpPr>
+          <p:cNvPr id="13" name="CuadroTexto 12">
+            <a:extLst>
+              <a:ext uri="{FF2B5EF4-FFF2-40B4-BE49-F238E27FC236}">
+                <a16:creationId xmlns:a16="http://schemas.microsoft.com/office/drawing/2014/main" id="{E23F3EEB-7D65-51A3-D8BF-6DDA1CD629A4}"/>
+              </a:ext>
+            </a:extLst>
+          </p:cNvPr>
+          <p:cNvSpPr txBox="1"/>
+          <p:nvPr/>
+        </p:nvSpPr>
+        <p:spPr>
+          <a:xfrm>
+            <a:off x="3793965" y="2022628"/>
+            <a:ext cx="301686" cy="369332"/>
+          </a:xfrm>
+          <a:prstGeom prst="rect">
+            <a:avLst/>
+          </a:prstGeom>
+          <a:noFill/>
+        </p:spPr>
+        <p:txBody>
+          <a:bodyPr wrap="none" rtlCol="0">
+            <a:spAutoFit/>
+          </a:bodyPr>
+          <a:lstStyle/>
+          <a:p>
+            <a:r>
+              <a:rPr lang="es-MX" dirty="0"/>
+              <a:t>1</a:t>
+            </a:r>
+          </a:p>
+        </p:txBody>
+      </p:sp>
+      <p:sp>
+        <p:nvSpPr>
+          <p:cNvPr id="14" name="Rectángulo 13">
+            <a:extLst>
+              <a:ext uri="{FF2B5EF4-FFF2-40B4-BE49-F238E27FC236}">
+                <a16:creationId xmlns:a16="http://schemas.microsoft.com/office/drawing/2014/main" id="{F0DD8A87-6469-8356-34F4-8DF5439DFB7F}"/>
+              </a:ext>
+            </a:extLst>
+          </p:cNvPr>
+          <p:cNvSpPr/>
+          <p:nvPr/>
+        </p:nvSpPr>
+        <p:spPr>
+          <a:xfrm>
+            <a:off x="3567400" y="2430985"/>
+            <a:ext cx="204716" cy="211541"/>
+          </a:xfrm>
+          <a:prstGeom prst="rect">
+            <a:avLst/>
+          </a:prstGeom>
+          <a:solidFill>
+            <a:schemeClr val="bg1"/>
+          </a:solidFill>
+        </p:spPr>
+        <p:style>
+          <a:lnRef idx="2">
+            <a:schemeClr val="accent1">
+              <a:shade val="15000"/>
+            </a:schemeClr>
+          </a:lnRef>
+          <a:fillRef idx="1">
+            <a:schemeClr val="accent1"/>
+          </a:fillRef>
+          <a:effectRef idx="0">
+            <a:schemeClr val="accent1"/>
+          </a:effectRef>
+          <a:fontRef idx="minor">
+            <a:schemeClr val="lt1"/>
+          </a:fontRef>
+        </p:style>
+        <p:txBody>
+          <a:bodyPr rtlCol="0" anchor="ctr"/>
+          <a:lstStyle/>
+          <a:p>
+            <a:pPr algn="ctr"/>
+            <a:endParaRPr lang="es-MX"/>
+          </a:p>
+        </p:txBody>
+      </p:sp>
+      <p:sp>
+        <p:nvSpPr>
+          <p:cNvPr id="16" name="Rectángulo 15">
+            <a:extLst>
+              <a:ext uri="{FF2B5EF4-FFF2-40B4-BE49-F238E27FC236}">
+                <a16:creationId xmlns:a16="http://schemas.microsoft.com/office/drawing/2014/main" id="{D6757AD5-A03F-2C40-4E40-F2EE6C5ED80B}"/>
+              </a:ext>
+            </a:extLst>
+          </p:cNvPr>
+          <p:cNvSpPr/>
+          <p:nvPr/>
+        </p:nvSpPr>
+        <p:spPr>
+          <a:xfrm>
+            <a:off x="3567400" y="2825694"/>
+            <a:ext cx="204716" cy="211541"/>
+          </a:xfrm>
+          <a:prstGeom prst="rect">
+            <a:avLst/>
+          </a:prstGeom>
+          <a:solidFill>
+            <a:schemeClr val="bg1"/>
+          </a:solidFill>
+        </p:spPr>
+        <p:style>
+          <a:lnRef idx="2">
+            <a:schemeClr val="accent1">
+              <a:shade val="15000"/>
+            </a:schemeClr>
+          </a:lnRef>
+          <a:fillRef idx="1">
+            <a:schemeClr val="accent1"/>
+          </a:fillRef>
+          <a:effectRef idx="0">
+            <a:schemeClr val="accent1"/>
+          </a:effectRef>
+          <a:fontRef idx="minor">
+            <a:schemeClr val="lt1"/>
+          </a:fontRef>
+        </p:style>
+        <p:txBody>
+          <a:bodyPr rtlCol="0" anchor="ctr"/>
+          <a:lstStyle/>
+          <a:p>
+            <a:pPr algn="ctr"/>
+            <a:endParaRPr lang="es-MX"/>
+          </a:p>
+        </p:txBody>
+      </p:sp>
+      <p:sp>
+        <p:nvSpPr>
+          <p:cNvPr id="17" name="CuadroTexto 16">
+            <a:extLst>
+              <a:ext uri="{FF2B5EF4-FFF2-40B4-BE49-F238E27FC236}">
+                <a16:creationId xmlns:a16="http://schemas.microsoft.com/office/drawing/2014/main" id="{4F857F12-4C18-B4C7-54AF-227CAAD247A0}"/>
+              </a:ext>
+            </a:extLst>
+          </p:cNvPr>
+          <p:cNvSpPr txBox="1"/>
+          <p:nvPr/>
+        </p:nvSpPr>
+        <p:spPr>
+          <a:xfrm>
+            <a:off x="3793965" y="2746798"/>
+            <a:ext cx="301686" cy="369332"/>
+          </a:xfrm>
+          <a:prstGeom prst="rect">
+            <a:avLst/>
+          </a:prstGeom>
+          <a:noFill/>
+        </p:spPr>
+        <p:txBody>
+          <a:bodyPr wrap="none" rtlCol="0">
+            <a:spAutoFit/>
+          </a:bodyPr>
+          <a:lstStyle/>
+          <a:p>
+            <a:r>
+              <a:rPr lang="es-MX" dirty="0"/>
+              <a:t>1</a:t>
+            </a:r>
+          </a:p>
+        </p:txBody>
+      </p:sp>
+    </p:spTree>
+    <p:extLst>
+      <p:ext uri="{BB962C8B-B14F-4D97-AF65-F5344CB8AC3E}">
+        <p14:creationId xmlns:p14="http://schemas.microsoft.com/office/powerpoint/2010/main" val="305804212"/>
+      </p:ext>
+    </p:extLst>
+  </p:cSld>
+  <p:clrMapOvr>
+    <a:masterClrMapping/>
+  </p:clrMapOvr>
+</p:sld>
+</file>
+
+<file path=ppt/slides/slide3.xml><?xml version="1.0" encoding="utf-8"?>
+<p:sld xmlns:a="http://schemas.openxmlformats.org/drawingml/2006/main" xmlns:r="http://schemas.openxmlformats.org/officeDocument/2006/relationships" xmlns:p="http://schemas.openxmlformats.org/presentationml/2006/main">
+  <p:cSld>
+    <p:spTree>
+      <p:nvGrpSpPr>
+        <p:cNvPr id="1" name=""/>
+        <p:cNvGrpSpPr/>
+        <p:nvPr/>
+      </p:nvGrpSpPr>
+      <p:grpSpPr>
+        <a:xfrm>
+          <a:off x="0" y="0"/>
+          <a:ext cx="0" cy="0"/>
+          <a:chOff x="0" y="0"/>
+          <a:chExt cx="0" cy="0"/>
+        </a:xfrm>
+      </p:grpSpPr>
+      <p:grpSp>
+        <p:nvGrpSpPr>
+          <p:cNvPr id="6" name="Grupo 5">
+            <a:extLst>
+              <a:ext uri="{FF2B5EF4-FFF2-40B4-BE49-F238E27FC236}">
+                <a16:creationId xmlns:a16="http://schemas.microsoft.com/office/drawing/2014/main" id="{0D3500AA-981A-2E7C-7B7C-E3587EE58D71}"/>
+              </a:ext>
+            </a:extLst>
+          </p:cNvPr>
+          <p:cNvGrpSpPr/>
+          <p:nvPr/>
+        </p:nvGrpSpPr>
+        <p:grpSpPr>
+          <a:xfrm>
+            <a:off x="1410269" y="443552"/>
+            <a:ext cx="9680812" cy="5404514"/>
+            <a:chOff x="3234519" y="614149"/>
+            <a:chExt cx="2251881" cy="5131558"/>
+          </a:xfrm>
+        </p:grpSpPr>
+        <p:sp>
+          <p:nvSpPr>
+            <p:cNvPr id="4" name="Rectángulo 3">
+              <a:extLst>
+                <a:ext uri="{FF2B5EF4-FFF2-40B4-BE49-F238E27FC236}">
+                  <a16:creationId xmlns:a16="http://schemas.microsoft.com/office/drawing/2014/main" id="{A2730AC7-F156-B7DE-E1BC-741FA8B74131}"/>
+                </a:ext>
+              </a:extLst>
+            </p:cNvPr>
+            <p:cNvSpPr/>
+            <p:nvPr/>
+          </p:nvSpPr>
+          <p:spPr>
+            <a:xfrm>
+              <a:off x="3234519" y="614149"/>
+              <a:ext cx="2251881" cy="5131558"/>
+            </a:xfrm>
+            <a:prstGeom prst="rect">
+              <a:avLst/>
+            </a:prstGeom>
+            <a:solidFill>
+              <a:schemeClr val="bg1"/>
+            </a:solidFill>
+          </p:spPr>
+          <p:style>
+            <a:lnRef idx="2">
+              <a:schemeClr val="accent1">
+                <a:shade val="15000"/>
+              </a:schemeClr>
+            </a:lnRef>
+            <a:fillRef idx="1">
+              <a:schemeClr val="accent1"/>
+            </a:fillRef>
+            <a:effectRef idx="0">
+              <a:schemeClr val="accent1"/>
+            </a:effectRef>
+            <a:fontRef idx="minor">
+              <a:schemeClr val="lt1"/>
+            </a:fontRef>
+          </p:style>
+          <p:txBody>
+            <a:bodyPr rtlCol="0" anchor="ctr"/>
+            <a:lstStyle/>
+            <a:p>
+              <a:pPr algn="ctr"/>
+              <a:endParaRPr lang="es-MX" dirty="0"/>
+            </a:p>
+          </p:txBody>
+        </p:sp>
+        <p:sp>
+          <p:nvSpPr>
+            <p:cNvPr id="5" name="Rectángulo 4">
+              <a:extLst>
+                <a:ext uri="{FF2B5EF4-FFF2-40B4-BE49-F238E27FC236}">
+                  <a16:creationId xmlns:a16="http://schemas.microsoft.com/office/drawing/2014/main" id="{580E63AF-39FC-B41F-57DD-C9BC88C91414}"/>
+                </a:ext>
+              </a:extLst>
+            </p:cNvPr>
+            <p:cNvSpPr/>
+            <p:nvPr/>
+          </p:nvSpPr>
+          <p:spPr>
+            <a:xfrm>
+              <a:off x="3234519" y="614149"/>
+              <a:ext cx="2251881" cy="286603"/>
+            </a:xfrm>
+            <a:prstGeom prst="rect">
+              <a:avLst/>
+            </a:prstGeom>
+          </p:spPr>
+          <p:style>
+            <a:lnRef idx="2">
+              <a:schemeClr val="accent1">
+                <a:shade val="15000"/>
+              </a:schemeClr>
+            </a:lnRef>
+            <a:fillRef idx="1">
+              <a:schemeClr val="accent1"/>
+            </a:fillRef>
+            <a:effectRef idx="0">
+              <a:schemeClr val="accent1"/>
+            </a:effectRef>
+            <a:fontRef idx="minor">
+              <a:schemeClr val="lt1"/>
+            </a:fontRef>
+          </p:style>
+          <p:txBody>
+            <a:bodyPr rtlCol="0" anchor="ctr"/>
+            <a:lstStyle/>
+            <a:p>
+              <a:pPr algn="ctr"/>
+              <a:endParaRPr lang="es-MX"/>
+            </a:p>
+          </p:txBody>
+        </p:sp>
+      </p:grpSp>
+      <p:sp>
+        <p:nvSpPr>
+          <p:cNvPr id="7" name="Rectángulo 6">
+            <a:extLst>
+              <a:ext uri="{FF2B5EF4-FFF2-40B4-BE49-F238E27FC236}">
+                <a16:creationId xmlns:a16="http://schemas.microsoft.com/office/drawing/2014/main" id="{2F9CDB7F-4E35-CE15-0ED5-9B620734DA12}"/>
+              </a:ext>
+            </a:extLst>
+          </p:cNvPr>
+          <p:cNvSpPr/>
+          <p:nvPr/>
+        </p:nvSpPr>
+        <p:spPr>
+          <a:xfrm>
+            <a:off x="1528548" y="907576"/>
+            <a:ext cx="3411940" cy="4476465"/>
+          </a:xfrm>
+          <a:prstGeom prst="rect">
+            <a:avLst/>
+          </a:prstGeom>
+          <a:solidFill>
+            <a:schemeClr val="bg1"/>
+          </a:solidFill>
+        </p:spPr>
+        <p:style>
+          <a:lnRef idx="2">
+            <a:schemeClr val="accent1">
+              <a:shade val="15000"/>
+            </a:schemeClr>
+          </a:lnRef>
+          <a:fillRef idx="1">
+            <a:schemeClr val="accent1"/>
+          </a:fillRef>
+          <a:effectRef idx="0">
+            <a:schemeClr val="accent1"/>
+          </a:effectRef>
+          <a:fontRef idx="minor">
+            <a:schemeClr val="lt1"/>
+          </a:fontRef>
+        </p:style>
+        <p:txBody>
+          <a:bodyPr rtlCol="0" anchor="ctr"/>
+          <a:lstStyle/>
+          <a:p>
+            <a:pPr algn="ctr"/>
+            <a:endParaRPr lang="es-MX"/>
+          </a:p>
+        </p:txBody>
+      </p:sp>
+      <p:sp>
+        <p:nvSpPr>
+          <p:cNvPr id="8" name="Rectángulo 7">
+            <a:extLst>
+              <a:ext uri="{FF2B5EF4-FFF2-40B4-BE49-F238E27FC236}">
+                <a16:creationId xmlns:a16="http://schemas.microsoft.com/office/drawing/2014/main" id="{E8F333BD-30ED-6662-3A77-1D944A17E066}"/>
+              </a:ext>
+            </a:extLst>
+          </p:cNvPr>
+          <p:cNvSpPr/>
+          <p:nvPr/>
+        </p:nvSpPr>
+        <p:spPr>
+          <a:xfrm>
+            <a:off x="5291039" y="5011696"/>
+            <a:ext cx="1009934" cy="301848"/>
+          </a:xfrm>
+          <a:prstGeom prst="rect">
+            <a:avLst/>
+          </a:prstGeom>
+        </p:spPr>
+        <p:style>
+          <a:lnRef idx="2">
+            <a:schemeClr val="accent1">
+              <a:shade val="15000"/>
+            </a:schemeClr>
+          </a:lnRef>
+          <a:fillRef idx="1">
+            <a:schemeClr val="accent1"/>
+          </a:fillRef>
+          <a:effectRef idx="0">
+            <a:schemeClr val="accent1"/>
+          </a:effectRef>
+          <a:fontRef idx="minor">
+            <a:schemeClr val="lt1"/>
+          </a:fontRef>
+        </p:style>
+        <p:txBody>
+          <a:bodyPr rtlCol="0" anchor="ctr"/>
+          <a:lstStyle/>
+          <a:p>
+            <a:pPr algn="ctr"/>
+            <a:r>
+              <a:rPr lang="es-MX" dirty="0" err="1"/>
+              <a:t>Add</a:t>
+            </a:r>
+            <a:endParaRPr lang="es-MX" dirty="0"/>
+          </a:p>
+        </p:txBody>
+      </p:sp>
+      <p:sp>
+        <p:nvSpPr>
+          <p:cNvPr id="9" name="Rectángulo 8">
+            <a:extLst>
+              <a:ext uri="{FF2B5EF4-FFF2-40B4-BE49-F238E27FC236}">
+                <a16:creationId xmlns:a16="http://schemas.microsoft.com/office/drawing/2014/main" id="{8370E968-7114-FDC6-F443-18364625491A}"/>
+              </a:ext>
+            </a:extLst>
+          </p:cNvPr>
+          <p:cNvSpPr/>
+          <p:nvPr/>
+        </p:nvSpPr>
+        <p:spPr>
+          <a:xfrm>
+            <a:off x="8265993" y="3147405"/>
+            <a:ext cx="1173707" cy="301848"/>
+          </a:xfrm>
+          <a:prstGeom prst="rect">
+            <a:avLst/>
+          </a:prstGeom>
+        </p:spPr>
+        <p:style>
+          <a:lnRef idx="2">
+            <a:schemeClr val="accent1">
+              <a:shade val="15000"/>
+            </a:schemeClr>
+          </a:lnRef>
+          <a:fillRef idx="1">
+            <a:schemeClr val="accent1"/>
+          </a:fillRef>
+          <a:effectRef idx="0">
+            <a:schemeClr val="accent1"/>
+          </a:effectRef>
+          <a:fontRef idx="minor">
+            <a:schemeClr val="lt1"/>
+          </a:fontRef>
+        </p:style>
+        <p:txBody>
+          <a:bodyPr rtlCol="0" anchor="ctr"/>
+          <a:lstStyle/>
+          <a:p>
+            <a:pPr algn="ctr"/>
+            <a:endParaRPr lang="es-MX"/>
+          </a:p>
+        </p:txBody>
+      </p:sp>
+      <p:sp>
+        <p:nvSpPr>
+          <p:cNvPr id="10" name="Rectángulo 9">
+            <a:extLst>
+              <a:ext uri="{FF2B5EF4-FFF2-40B4-BE49-F238E27FC236}">
+                <a16:creationId xmlns:a16="http://schemas.microsoft.com/office/drawing/2014/main" id="{2CC8D39B-7AC5-5501-B696-B4BAE3C55DDD}"/>
+              </a:ext>
+            </a:extLst>
+          </p:cNvPr>
+          <p:cNvSpPr/>
+          <p:nvPr/>
+        </p:nvSpPr>
+        <p:spPr>
+          <a:xfrm>
+            <a:off x="5256403" y="1296050"/>
+            <a:ext cx="2415653" cy="3497238"/>
+          </a:xfrm>
+          <a:prstGeom prst="rect">
+            <a:avLst/>
+          </a:prstGeom>
+          <a:solidFill>
+            <a:schemeClr val="bg1"/>
+          </a:solidFill>
+        </p:spPr>
+        <p:style>
+          <a:lnRef idx="2">
+            <a:schemeClr val="accent1">
+              <a:shade val="15000"/>
+            </a:schemeClr>
+          </a:lnRef>
+          <a:fillRef idx="1">
+            <a:schemeClr val="accent1"/>
+          </a:fillRef>
+          <a:effectRef idx="0">
+            <a:schemeClr val="accent1"/>
+          </a:effectRef>
+          <a:fontRef idx="minor">
+            <a:schemeClr val="lt1"/>
+          </a:fontRef>
+        </p:style>
+        <p:txBody>
+          <a:bodyPr rtlCol="0" anchor="ctr"/>
+          <a:lstStyle/>
+          <a:p>
+            <a:pPr algn="ctr"/>
+            <a:endParaRPr lang="es-MX"/>
+          </a:p>
+        </p:txBody>
+      </p:sp>
+      <p:sp>
+        <p:nvSpPr>
+          <p:cNvPr id="12" name="Rectángulo 11">
+            <a:extLst>
+              <a:ext uri="{FF2B5EF4-FFF2-40B4-BE49-F238E27FC236}">
+                <a16:creationId xmlns:a16="http://schemas.microsoft.com/office/drawing/2014/main" id="{54F6A480-48DA-BE2D-A8A8-A98FF66FEBA9}"/>
+              </a:ext>
+            </a:extLst>
+          </p:cNvPr>
+          <p:cNvSpPr/>
+          <p:nvPr/>
+        </p:nvSpPr>
+        <p:spPr>
+          <a:xfrm>
+            <a:off x="8089847" y="1296050"/>
+            <a:ext cx="2640845" cy="3497238"/>
+          </a:xfrm>
+          <a:prstGeom prst="rect">
+            <a:avLst/>
+          </a:prstGeom>
+          <a:solidFill>
+            <a:schemeClr val="bg1"/>
+          </a:solidFill>
+        </p:spPr>
+        <p:style>
+          <a:lnRef idx="2">
+            <a:schemeClr val="accent1">
+              <a:shade val="15000"/>
+            </a:schemeClr>
+          </a:lnRef>
+          <a:fillRef idx="1">
+            <a:schemeClr val="accent1"/>
+          </a:fillRef>
+          <a:effectRef idx="0">
+            <a:schemeClr val="accent1"/>
+          </a:effectRef>
+          <a:fontRef idx="minor">
+            <a:schemeClr val="lt1"/>
+          </a:fontRef>
+        </p:style>
+        <p:txBody>
+          <a:bodyPr rtlCol="0" anchor="ctr"/>
+          <a:lstStyle/>
+          <a:p>
+            <a:pPr algn="ctr"/>
+            <a:endParaRPr lang="es-MX"/>
+          </a:p>
+        </p:txBody>
+      </p:sp>
+      <p:sp>
+        <p:nvSpPr>
+          <p:cNvPr id="15" name="CuadroTexto 14">
+            <a:extLst>
+              <a:ext uri="{FF2B5EF4-FFF2-40B4-BE49-F238E27FC236}">
+                <a16:creationId xmlns:a16="http://schemas.microsoft.com/office/drawing/2014/main" id="{7E6CAEAF-6EA5-ACDA-48D8-DC5C125527D0}"/>
+              </a:ext>
+            </a:extLst>
+          </p:cNvPr>
+          <p:cNvSpPr txBox="1"/>
+          <p:nvPr/>
+        </p:nvSpPr>
+        <p:spPr>
+          <a:xfrm>
+            <a:off x="5256403" y="926718"/>
+            <a:ext cx="1225144" cy="369332"/>
+          </a:xfrm>
+          <a:prstGeom prst="rect">
+            <a:avLst/>
+          </a:prstGeom>
+          <a:noFill/>
+        </p:spPr>
+        <p:txBody>
+          <a:bodyPr wrap="none" rtlCol="0">
+            <a:spAutoFit/>
+          </a:bodyPr>
+          <a:lstStyle/>
+          <a:p>
+            <a:r>
+              <a:rPr lang="es-MX" dirty="0"/>
+              <a:t>Test </a:t>
+            </a:r>
+            <a:r>
+              <a:rPr lang="es-MX" dirty="0" err="1"/>
+              <a:t>details</a:t>
+            </a:r>
+            <a:endParaRPr lang="es-MX" dirty="0"/>
+          </a:p>
+        </p:txBody>
+      </p:sp>
+      <p:sp>
+        <p:nvSpPr>
+          <p:cNvPr id="16" name="Rectángulo 15">
+            <a:extLst>
+              <a:ext uri="{FF2B5EF4-FFF2-40B4-BE49-F238E27FC236}">
+                <a16:creationId xmlns:a16="http://schemas.microsoft.com/office/drawing/2014/main" id="{0C344BB8-4FFB-CF52-D5F9-D92203CDA588}"/>
+              </a:ext>
+            </a:extLst>
+          </p:cNvPr>
+          <p:cNvSpPr/>
+          <p:nvPr/>
+        </p:nvSpPr>
+        <p:spPr>
+          <a:xfrm>
+            <a:off x="6585045" y="5011696"/>
+            <a:ext cx="1009934" cy="301848"/>
+          </a:xfrm>
+          <a:prstGeom prst="rect">
+            <a:avLst/>
+          </a:prstGeom>
+        </p:spPr>
+        <p:style>
+          <a:lnRef idx="2">
+            <a:schemeClr val="accent1">
+              <a:shade val="15000"/>
+            </a:schemeClr>
+          </a:lnRef>
+          <a:fillRef idx="1">
+            <a:schemeClr val="accent1"/>
+          </a:fillRef>
+          <a:effectRef idx="0">
+            <a:schemeClr val="accent1"/>
+          </a:effectRef>
+          <a:fontRef idx="minor">
+            <a:schemeClr val="lt1"/>
+          </a:fontRef>
+        </p:style>
+        <p:txBody>
+          <a:bodyPr rtlCol="0" anchor="ctr"/>
+          <a:lstStyle/>
+          <a:p>
+            <a:pPr algn="ctr"/>
+            <a:r>
+              <a:rPr lang="es-MX" dirty="0" err="1"/>
+              <a:t>Delete</a:t>
+            </a:r>
+            <a:endParaRPr lang="es-MX" dirty="0"/>
+          </a:p>
+        </p:txBody>
+      </p:sp>
+      <p:sp>
+        <p:nvSpPr>
+          <p:cNvPr id="17" name="CuadroTexto 16">
+            <a:extLst>
+              <a:ext uri="{FF2B5EF4-FFF2-40B4-BE49-F238E27FC236}">
+                <a16:creationId xmlns:a16="http://schemas.microsoft.com/office/drawing/2014/main" id="{9A4447A8-150B-8306-B8FD-AF63A5735252}"/>
+              </a:ext>
+            </a:extLst>
+          </p:cNvPr>
+          <p:cNvSpPr txBox="1"/>
+          <p:nvPr/>
+        </p:nvSpPr>
+        <p:spPr>
+          <a:xfrm>
+            <a:off x="7987971" y="926718"/>
+            <a:ext cx="1037463" cy="369332"/>
+          </a:xfrm>
+          <a:prstGeom prst="rect">
+            <a:avLst/>
+          </a:prstGeom>
+          <a:noFill/>
+        </p:spPr>
+        <p:txBody>
+          <a:bodyPr wrap="none" rtlCol="0">
+            <a:spAutoFit/>
+          </a:bodyPr>
+          <a:lstStyle/>
+          <a:p>
+            <a:r>
+              <a:rPr lang="es-MX" dirty="0"/>
+              <a:t>Variables</a:t>
+            </a:r>
+          </a:p>
+        </p:txBody>
+      </p:sp>
+      <p:sp>
+        <p:nvSpPr>
+          <p:cNvPr id="18" name="Rectángulo 17">
+            <a:extLst>
+              <a:ext uri="{FF2B5EF4-FFF2-40B4-BE49-F238E27FC236}">
+                <a16:creationId xmlns:a16="http://schemas.microsoft.com/office/drawing/2014/main" id="{8FC2CE6C-4C61-113C-5F18-AB6FF711806F}"/>
+              </a:ext>
+            </a:extLst>
+          </p:cNvPr>
+          <p:cNvSpPr/>
+          <p:nvPr/>
+        </p:nvSpPr>
+        <p:spPr>
+          <a:xfrm>
+            <a:off x="8022607" y="5018829"/>
+            <a:ext cx="1009934" cy="301848"/>
+          </a:xfrm>
+          <a:prstGeom prst="rect">
+            <a:avLst/>
+          </a:prstGeom>
+        </p:spPr>
+        <p:style>
+          <a:lnRef idx="2">
+            <a:schemeClr val="accent1">
+              <a:shade val="15000"/>
+            </a:schemeClr>
+          </a:lnRef>
+          <a:fillRef idx="1">
+            <a:schemeClr val="accent1"/>
+          </a:fillRef>
+          <a:effectRef idx="0">
+            <a:schemeClr val="accent1"/>
+          </a:effectRef>
+          <a:fontRef idx="minor">
+            <a:schemeClr val="lt1"/>
+          </a:fontRef>
+        </p:style>
+        <p:txBody>
+          <a:bodyPr rtlCol="0" anchor="ctr"/>
+          <a:lstStyle/>
+          <a:p>
+            <a:pPr algn="ctr"/>
+            <a:r>
+              <a:rPr lang="es-MX" dirty="0" err="1"/>
+              <a:t>Add</a:t>
+            </a:r>
+            <a:endParaRPr lang="es-MX" dirty="0"/>
+          </a:p>
+        </p:txBody>
+      </p:sp>
+      <p:sp>
+        <p:nvSpPr>
+          <p:cNvPr id="19" name="Rectángulo 18">
+            <a:extLst>
+              <a:ext uri="{FF2B5EF4-FFF2-40B4-BE49-F238E27FC236}">
+                <a16:creationId xmlns:a16="http://schemas.microsoft.com/office/drawing/2014/main" id="{36E0E86F-02FE-90E7-DDBB-316A12044970}"/>
+              </a:ext>
+            </a:extLst>
+          </p:cNvPr>
+          <p:cNvSpPr/>
+          <p:nvPr/>
+        </p:nvSpPr>
+        <p:spPr>
+          <a:xfrm>
+            <a:off x="9316613" y="5018829"/>
+            <a:ext cx="1009934" cy="301848"/>
+          </a:xfrm>
+          <a:prstGeom prst="rect">
+            <a:avLst/>
+          </a:prstGeom>
+        </p:spPr>
+        <p:style>
+          <a:lnRef idx="2">
+            <a:schemeClr val="accent1">
+              <a:shade val="15000"/>
+            </a:schemeClr>
+          </a:lnRef>
+          <a:fillRef idx="1">
+            <a:schemeClr val="accent1"/>
+          </a:fillRef>
+          <a:effectRef idx="0">
+            <a:schemeClr val="accent1"/>
+          </a:effectRef>
+          <a:fontRef idx="minor">
+            <a:schemeClr val="lt1"/>
+          </a:fontRef>
+        </p:style>
+        <p:txBody>
+          <a:bodyPr rtlCol="0" anchor="ctr"/>
+          <a:lstStyle/>
+          <a:p>
+            <a:pPr algn="ctr"/>
+            <a:r>
+              <a:rPr lang="es-MX" dirty="0" err="1"/>
+              <a:t>Delete</a:t>
+            </a:r>
+            <a:endParaRPr lang="es-MX" dirty="0"/>
+          </a:p>
+        </p:txBody>
+      </p:sp>
+      <p:sp>
+        <p:nvSpPr>
+          <p:cNvPr id="20" name="Rectángulo 19">
+            <a:extLst>
+              <a:ext uri="{FF2B5EF4-FFF2-40B4-BE49-F238E27FC236}">
+                <a16:creationId xmlns:a16="http://schemas.microsoft.com/office/drawing/2014/main" id="{28DB1A85-0C5F-DEA8-7CF5-3FCDACE98A40}"/>
+              </a:ext>
+            </a:extLst>
+          </p:cNvPr>
+          <p:cNvSpPr/>
+          <p:nvPr/>
+        </p:nvSpPr>
+        <p:spPr>
+          <a:xfrm>
+            <a:off x="1528548" y="907576"/>
+            <a:ext cx="1201004" cy="301848"/>
+          </a:xfrm>
+          <a:prstGeom prst="rect">
+            <a:avLst/>
+          </a:prstGeom>
+        </p:spPr>
+        <p:style>
+          <a:lnRef idx="2">
+            <a:schemeClr val="accent1">
+              <a:shade val="15000"/>
+            </a:schemeClr>
+          </a:lnRef>
+          <a:fillRef idx="1">
+            <a:schemeClr val="accent1"/>
+          </a:fillRef>
+          <a:effectRef idx="0">
+            <a:schemeClr val="accent1"/>
+          </a:effectRef>
+          <a:fontRef idx="minor">
+            <a:schemeClr val="lt1"/>
+          </a:fontRef>
+        </p:style>
+        <p:txBody>
+          <a:bodyPr rtlCol="0" anchor="ctr"/>
+          <a:lstStyle/>
+          <a:p>
+            <a:pPr algn="ctr"/>
+            <a:r>
+              <a:rPr lang="es-MX" dirty="0"/>
+              <a:t>Test</a:t>
+            </a:r>
+          </a:p>
+        </p:txBody>
+      </p:sp>
+      <p:sp>
+        <p:nvSpPr>
+          <p:cNvPr id="21" name="Rectángulo 20">
+            <a:extLst>
+              <a:ext uri="{FF2B5EF4-FFF2-40B4-BE49-F238E27FC236}">
+                <a16:creationId xmlns:a16="http://schemas.microsoft.com/office/drawing/2014/main" id="{B7248590-DA26-B0E6-213A-81F0DCEE4548}"/>
+              </a:ext>
+            </a:extLst>
+          </p:cNvPr>
+          <p:cNvSpPr/>
+          <p:nvPr/>
+        </p:nvSpPr>
+        <p:spPr>
+          <a:xfrm>
+            <a:off x="2724304" y="910960"/>
+            <a:ext cx="2216183" cy="298464"/>
+          </a:xfrm>
+          <a:prstGeom prst="rect">
+            <a:avLst/>
+          </a:prstGeom>
+        </p:spPr>
+        <p:style>
+          <a:lnRef idx="2">
+            <a:schemeClr val="accent1">
+              <a:shade val="15000"/>
+            </a:schemeClr>
+          </a:lnRef>
+          <a:fillRef idx="1">
+            <a:schemeClr val="accent1"/>
+          </a:fillRef>
+          <a:effectRef idx="0">
+            <a:schemeClr val="accent1"/>
+          </a:effectRef>
+          <a:fontRef idx="minor">
+            <a:schemeClr val="lt1"/>
+          </a:fontRef>
+        </p:style>
+        <p:txBody>
+          <a:bodyPr rtlCol="0" anchor="ctr"/>
+          <a:lstStyle/>
+          <a:p>
+            <a:pPr algn="ctr"/>
+            <a:r>
+              <a:rPr lang="es-MX" dirty="0"/>
+              <a:t>Script</a:t>
+            </a:r>
+          </a:p>
+        </p:txBody>
+      </p:sp>
+      <p:sp>
+        <p:nvSpPr>
+          <p:cNvPr id="22" name="Rectángulo 21">
+            <a:extLst>
+              <a:ext uri="{FF2B5EF4-FFF2-40B4-BE49-F238E27FC236}">
+                <a16:creationId xmlns:a16="http://schemas.microsoft.com/office/drawing/2014/main" id="{9B8FE751-CD98-771D-9B09-6EEDC6C4B57D}"/>
+              </a:ext>
+            </a:extLst>
+          </p:cNvPr>
+          <p:cNvSpPr/>
+          <p:nvPr/>
+        </p:nvSpPr>
+        <p:spPr>
+          <a:xfrm>
+            <a:off x="1528548" y="1209424"/>
+            <a:ext cx="1195755" cy="264535"/>
+          </a:xfrm>
+          <a:prstGeom prst="rect">
+            <a:avLst/>
+          </a:prstGeom>
+          <a:solidFill>
+            <a:schemeClr val="bg1"/>
+          </a:solidFill>
+        </p:spPr>
+        <p:style>
+          <a:lnRef idx="2">
+            <a:schemeClr val="accent1">
+              <a:shade val="15000"/>
+            </a:schemeClr>
+          </a:lnRef>
+          <a:fillRef idx="1">
+            <a:schemeClr val="accent1"/>
+          </a:fillRef>
+          <a:effectRef idx="0">
+            <a:schemeClr val="accent1"/>
+          </a:effectRef>
+          <a:fontRef idx="minor">
+            <a:schemeClr val="lt1"/>
+          </a:fontRef>
+        </p:style>
+        <p:txBody>
+          <a:bodyPr rtlCol="0" anchor="ctr"/>
+          <a:lstStyle/>
+          <a:p>
+            <a:pPr algn="ctr"/>
+            <a:r>
+              <a:rPr lang="es-MX" dirty="0" err="1">
+                <a:solidFill>
+                  <a:sysClr val="windowText" lastClr="000000"/>
+                </a:solidFill>
+              </a:rPr>
+              <a:t>Example</a:t>
+            </a:r>
+            <a:endParaRPr lang="es-MX" dirty="0">
+              <a:solidFill>
+                <a:sysClr val="windowText" lastClr="000000"/>
+              </a:solidFill>
+            </a:endParaRPr>
+          </a:p>
+        </p:txBody>
+      </p:sp>
+      <p:sp>
+        <p:nvSpPr>
+          <p:cNvPr id="23" name="Rectángulo 22">
+            <a:extLst>
+              <a:ext uri="{FF2B5EF4-FFF2-40B4-BE49-F238E27FC236}">
+                <a16:creationId xmlns:a16="http://schemas.microsoft.com/office/drawing/2014/main" id="{91DB350C-B9E6-2A0F-6BAE-4EDC2F30F9B4}"/>
+              </a:ext>
+            </a:extLst>
+          </p:cNvPr>
+          <p:cNvSpPr/>
+          <p:nvPr/>
+        </p:nvSpPr>
+        <p:spPr>
+          <a:xfrm>
+            <a:off x="2729552" y="1209424"/>
+            <a:ext cx="2210935" cy="264535"/>
+          </a:xfrm>
+          <a:prstGeom prst="rect">
+            <a:avLst/>
+          </a:prstGeom>
+          <a:solidFill>
+            <a:schemeClr val="bg1"/>
+          </a:solidFill>
+        </p:spPr>
+        <p:style>
+          <a:lnRef idx="2">
+            <a:schemeClr val="accent1">
+              <a:shade val="15000"/>
+            </a:schemeClr>
+          </a:lnRef>
+          <a:fillRef idx="1">
+            <a:schemeClr val="accent1"/>
+          </a:fillRef>
+          <a:effectRef idx="0">
+            <a:schemeClr val="accent1"/>
+          </a:effectRef>
+          <a:fontRef idx="minor">
+            <a:schemeClr val="lt1"/>
+          </a:fontRef>
+        </p:style>
+        <p:txBody>
+          <a:bodyPr rtlCol="0" anchor="ctr"/>
+          <a:lstStyle/>
+          <a:p>
+            <a:pPr algn="ctr"/>
+            <a:r>
+              <a:rPr lang="es-MX" dirty="0">
+                <a:solidFill>
+                  <a:sysClr val="windowText" lastClr="000000"/>
+                </a:solidFill>
+              </a:rPr>
+              <a:t>Example.py</a:t>
+            </a:r>
+          </a:p>
+        </p:txBody>
+      </p:sp>
+      <p:sp>
+        <p:nvSpPr>
+          <p:cNvPr id="24" name="Rectángulo 23">
+            <a:extLst>
+              <a:ext uri="{FF2B5EF4-FFF2-40B4-BE49-F238E27FC236}">
+                <a16:creationId xmlns:a16="http://schemas.microsoft.com/office/drawing/2014/main" id="{F1EB7353-C92D-51F1-6BB4-00621E8255C0}"/>
+              </a:ext>
+            </a:extLst>
+          </p:cNvPr>
+          <p:cNvSpPr/>
+          <p:nvPr/>
+        </p:nvSpPr>
+        <p:spPr>
+          <a:xfrm>
+            <a:off x="5272328" y="1304471"/>
+            <a:ext cx="791427" cy="236602"/>
+          </a:xfrm>
+          <a:prstGeom prst="rect">
+            <a:avLst/>
+          </a:prstGeom>
+        </p:spPr>
+        <p:style>
+          <a:lnRef idx="2">
+            <a:schemeClr val="accent1">
+              <a:shade val="15000"/>
+            </a:schemeClr>
+          </a:lnRef>
+          <a:fillRef idx="1">
+            <a:schemeClr val="accent1"/>
+          </a:fillRef>
+          <a:effectRef idx="0">
+            <a:schemeClr val="accent1"/>
+          </a:effectRef>
+          <a:fontRef idx="minor">
+            <a:schemeClr val="lt1"/>
+          </a:fontRef>
+        </p:style>
+        <p:txBody>
+          <a:bodyPr rtlCol="0" anchor="ctr"/>
+          <a:lstStyle/>
+          <a:p>
+            <a:pPr algn="ctr"/>
+            <a:r>
+              <a:rPr lang="es-MX" dirty="0"/>
+              <a:t>Type</a:t>
+            </a:r>
+          </a:p>
+        </p:txBody>
+      </p:sp>
+      <p:sp>
+        <p:nvSpPr>
+          <p:cNvPr id="25" name="Rectángulo 24">
+            <a:extLst>
+              <a:ext uri="{FF2B5EF4-FFF2-40B4-BE49-F238E27FC236}">
+                <a16:creationId xmlns:a16="http://schemas.microsoft.com/office/drawing/2014/main" id="{CEFEA687-A50B-B63D-2819-CEC3C55AA4F1}"/>
+              </a:ext>
+            </a:extLst>
+          </p:cNvPr>
+          <p:cNvSpPr/>
+          <p:nvPr/>
+        </p:nvSpPr>
+        <p:spPr>
+          <a:xfrm>
+            <a:off x="6079681" y="1307855"/>
+            <a:ext cx="1592376" cy="233218"/>
+          </a:xfrm>
+          <a:prstGeom prst="rect">
+            <a:avLst/>
+          </a:prstGeom>
+        </p:spPr>
+        <p:style>
+          <a:lnRef idx="2">
+            <a:schemeClr val="accent1">
+              <a:shade val="15000"/>
+            </a:schemeClr>
+          </a:lnRef>
+          <a:fillRef idx="1">
+            <a:schemeClr val="accent1"/>
+          </a:fillRef>
+          <a:effectRef idx="0">
+            <a:schemeClr val="accent1"/>
+          </a:effectRef>
+          <a:fontRef idx="minor">
+            <a:schemeClr val="lt1"/>
+          </a:fontRef>
+        </p:style>
+        <p:txBody>
+          <a:bodyPr rtlCol="0" anchor="ctr"/>
+          <a:lstStyle/>
+          <a:p>
+            <a:pPr algn="ctr"/>
+            <a:r>
+              <a:rPr lang="es-MX" dirty="0"/>
+              <a:t>Variable</a:t>
+            </a:r>
+          </a:p>
+        </p:txBody>
+      </p:sp>
+      <p:sp>
+        <p:nvSpPr>
+          <p:cNvPr id="26" name="Rectángulo 25">
+            <a:extLst>
+              <a:ext uri="{FF2B5EF4-FFF2-40B4-BE49-F238E27FC236}">
+                <a16:creationId xmlns:a16="http://schemas.microsoft.com/office/drawing/2014/main" id="{A4A84DF1-9F8D-A0D9-31D9-88F3650CB863}"/>
+              </a:ext>
+            </a:extLst>
+          </p:cNvPr>
+          <p:cNvSpPr/>
+          <p:nvPr/>
+        </p:nvSpPr>
+        <p:spPr>
+          <a:xfrm>
+            <a:off x="5256402" y="1549495"/>
+            <a:ext cx="823279" cy="233218"/>
+          </a:xfrm>
+          <a:prstGeom prst="rect">
+            <a:avLst/>
+          </a:prstGeom>
+          <a:solidFill>
+            <a:schemeClr val="bg1"/>
+          </a:solidFill>
+        </p:spPr>
+        <p:style>
+          <a:lnRef idx="2">
+            <a:schemeClr val="accent1">
+              <a:shade val="15000"/>
+            </a:schemeClr>
+          </a:lnRef>
+          <a:fillRef idx="1">
+            <a:schemeClr val="accent1"/>
+          </a:fillRef>
+          <a:effectRef idx="0">
+            <a:schemeClr val="accent1"/>
+          </a:effectRef>
+          <a:fontRef idx="minor">
+            <a:schemeClr val="lt1"/>
+          </a:fontRef>
+        </p:style>
+        <p:txBody>
+          <a:bodyPr rtlCol="0" anchor="ctr"/>
+          <a:lstStyle/>
+          <a:p>
+            <a:pPr algn="ctr"/>
+            <a:r>
+              <a:rPr lang="es-MX" dirty="0" err="1">
+                <a:solidFill>
+                  <a:sysClr val="windowText" lastClr="000000"/>
+                </a:solidFill>
+              </a:rPr>
+              <a:t>str</a:t>
+            </a:r>
+            <a:endParaRPr lang="es-MX" dirty="0">
+              <a:solidFill>
+                <a:sysClr val="windowText" lastClr="000000"/>
+              </a:solidFill>
+            </a:endParaRPr>
+          </a:p>
+        </p:txBody>
+      </p:sp>
+      <p:sp>
+        <p:nvSpPr>
+          <p:cNvPr id="27" name="Rectángulo 26">
+            <a:extLst>
+              <a:ext uri="{FF2B5EF4-FFF2-40B4-BE49-F238E27FC236}">
+                <a16:creationId xmlns:a16="http://schemas.microsoft.com/office/drawing/2014/main" id="{929E166E-FAF6-0007-6C0B-CA0E61B5E469}"/>
+              </a:ext>
+            </a:extLst>
+          </p:cNvPr>
+          <p:cNvSpPr/>
+          <p:nvPr/>
+        </p:nvSpPr>
+        <p:spPr>
+          <a:xfrm>
+            <a:off x="6079680" y="1551851"/>
+            <a:ext cx="1592376" cy="239283"/>
+          </a:xfrm>
+          <a:prstGeom prst="rect">
+            <a:avLst/>
+          </a:prstGeom>
+          <a:solidFill>
+            <a:schemeClr val="bg1"/>
+          </a:solidFill>
+        </p:spPr>
+        <p:style>
+          <a:lnRef idx="2">
+            <a:schemeClr val="accent1">
+              <a:shade val="15000"/>
+            </a:schemeClr>
+          </a:lnRef>
+          <a:fillRef idx="1">
+            <a:schemeClr val="accent1"/>
+          </a:fillRef>
+          <a:effectRef idx="0">
+            <a:schemeClr val="accent1"/>
+          </a:effectRef>
+          <a:fontRef idx="minor">
+            <a:schemeClr val="lt1"/>
+          </a:fontRef>
+        </p:style>
+        <p:txBody>
+          <a:bodyPr rtlCol="0" anchor="ctr"/>
+          <a:lstStyle/>
+          <a:p>
+            <a:pPr algn="ctr"/>
+            <a:r>
+              <a:rPr lang="es-MX" dirty="0" err="1">
+                <a:solidFill>
+                  <a:sysClr val="windowText" lastClr="000000"/>
+                </a:solidFill>
+              </a:rPr>
+              <a:t>Name</a:t>
+            </a:r>
+            <a:endParaRPr lang="es-MX" dirty="0">
+              <a:solidFill>
+                <a:sysClr val="windowText" lastClr="000000"/>
+              </a:solidFill>
+            </a:endParaRPr>
+          </a:p>
+        </p:txBody>
+      </p:sp>
+      <p:sp>
+        <p:nvSpPr>
+          <p:cNvPr id="28" name="Triángulo isósceles 27">
+            <a:extLst>
+              <a:ext uri="{FF2B5EF4-FFF2-40B4-BE49-F238E27FC236}">
+                <a16:creationId xmlns:a16="http://schemas.microsoft.com/office/drawing/2014/main" id="{590A1BEA-4B17-EE29-84D3-613AC0A4846E}"/>
+              </a:ext>
+            </a:extLst>
+          </p:cNvPr>
+          <p:cNvSpPr/>
+          <p:nvPr/>
+        </p:nvSpPr>
+        <p:spPr>
+          <a:xfrm rot="10800000">
+            <a:off x="7434742" y="1590376"/>
+            <a:ext cx="197636" cy="151455"/>
+          </a:xfrm>
+          <a:prstGeom prst="triangle">
+            <a:avLst/>
+          </a:prstGeom>
+        </p:spPr>
+        <p:style>
+          <a:lnRef idx="2">
+            <a:schemeClr val="accent1">
+              <a:shade val="15000"/>
+            </a:schemeClr>
+          </a:lnRef>
+          <a:fillRef idx="1">
+            <a:schemeClr val="accent1"/>
+          </a:fillRef>
+          <a:effectRef idx="0">
+            <a:schemeClr val="accent1"/>
+          </a:effectRef>
+          <a:fontRef idx="minor">
+            <a:schemeClr val="lt1"/>
+          </a:fontRef>
+        </p:style>
+        <p:txBody>
+          <a:bodyPr rtlCol="0" anchor="ctr"/>
+          <a:lstStyle/>
+          <a:p>
+            <a:pPr algn="ctr"/>
+            <a:endParaRPr lang="es-MX"/>
+          </a:p>
+        </p:txBody>
+      </p:sp>
+      <p:sp>
+        <p:nvSpPr>
+          <p:cNvPr id="29" name="Rectángulo 28">
+            <a:extLst>
+              <a:ext uri="{FF2B5EF4-FFF2-40B4-BE49-F238E27FC236}">
+                <a16:creationId xmlns:a16="http://schemas.microsoft.com/office/drawing/2014/main" id="{9A3C10F0-63DA-86BD-FFCA-589A9B90B281}"/>
+              </a:ext>
+            </a:extLst>
+          </p:cNvPr>
+          <p:cNvSpPr/>
+          <p:nvPr/>
+        </p:nvSpPr>
+        <p:spPr>
+          <a:xfrm>
+            <a:off x="8116132" y="1313029"/>
+            <a:ext cx="1031894" cy="244656"/>
+          </a:xfrm>
+          <a:prstGeom prst="rect">
+            <a:avLst/>
+          </a:prstGeom>
+        </p:spPr>
+        <p:style>
+          <a:lnRef idx="2">
+            <a:schemeClr val="accent1">
+              <a:shade val="15000"/>
+            </a:schemeClr>
+          </a:lnRef>
+          <a:fillRef idx="1">
+            <a:schemeClr val="accent1"/>
+          </a:fillRef>
+          <a:effectRef idx="0">
+            <a:schemeClr val="accent1"/>
+          </a:effectRef>
+          <a:fontRef idx="minor">
+            <a:schemeClr val="lt1"/>
+          </a:fontRef>
+        </p:style>
+        <p:txBody>
+          <a:bodyPr rtlCol="0" anchor="ctr"/>
+          <a:lstStyle/>
+          <a:p>
+            <a:pPr algn="ctr"/>
+            <a:r>
+              <a:rPr lang="es-MX" dirty="0" err="1"/>
+              <a:t>Name</a:t>
+            </a:r>
+            <a:endParaRPr lang="es-MX" dirty="0"/>
+          </a:p>
+        </p:txBody>
+      </p:sp>
+      <p:sp>
+        <p:nvSpPr>
+          <p:cNvPr id="30" name="Rectángulo 29">
+            <a:extLst>
+              <a:ext uri="{FF2B5EF4-FFF2-40B4-BE49-F238E27FC236}">
+                <a16:creationId xmlns:a16="http://schemas.microsoft.com/office/drawing/2014/main" id="{1E9353AF-0A17-F5C7-FF2A-95B5F4C6F85C}"/>
+              </a:ext>
+            </a:extLst>
+          </p:cNvPr>
+          <p:cNvSpPr/>
+          <p:nvPr/>
+        </p:nvSpPr>
+        <p:spPr>
+          <a:xfrm>
+            <a:off x="9163954" y="1316412"/>
+            <a:ext cx="1566737" cy="241273"/>
+          </a:xfrm>
+          <a:prstGeom prst="rect">
+            <a:avLst/>
+          </a:prstGeom>
+        </p:spPr>
+        <p:style>
+          <a:lnRef idx="2">
+            <a:schemeClr val="accent1">
+              <a:shade val="15000"/>
+            </a:schemeClr>
+          </a:lnRef>
+          <a:fillRef idx="1">
+            <a:schemeClr val="accent1"/>
+          </a:fillRef>
+          <a:effectRef idx="0">
+            <a:schemeClr val="accent1"/>
+          </a:effectRef>
+          <a:fontRef idx="minor">
+            <a:schemeClr val="lt1"/>
+          </a:fontRef>
+        </p:style>
+        <p:txBody>
+          <a:bodyPr rtlCol="0" anchor="ctr"/>
+          <a:lstStyle/>
+          <a:p>
+            <a:pPr algn="ctr"/>
+            <a:r>
+              <a:rPr lang="es-MX" dirty="0"/>
+              <a:t>Type</a:t>
+            </a:r>
+          </a:p>
+        </p:txBody>
+      </p:sp>
+      <p:sp>
+        <p:nvSpPr>
+          <p:cNvPr id="31" name="Rectángulo 30">
+            <a:extLst>
+              <a:ext uri="{FF2B5EF4-FFF2-40B4-BE49-F238E27FC236}">
+                <a16:creationId xmlns:a16="http://schemas.microsoft.com/office/drawing/2014/main" id="{1F0FC2A3-FD1F-4680-4CA9-D91D4F27C37A}"/>
+              </a:ext>
+            </a:extLst>
+          </p:cNvPr>
+          <p:cNvSpPr/>
+          <p:nvPr/>
+        </p:nvSpPr>
+        <p:spPr>
+          <a:xfrm>
+            <a:off x="8100206" y="1558052"/>
+            <a:ext cx="1037463" cy="241273"/>
+          </a:xfrm>
+          <a:prstGeom prst="rect">
+            <a:avLst/>
+          </a:prstGeom>
+          <a:solidFill>
+            <a:schemeClr val="bg1"/>
+          </a:solidFill>
+        </p:spPr>
+        <p:style>
+          <a:lnRef idx="2">
+            <a:schemeClr val="accent1">
+              <a:shade val="15000"/>
+            </a:schemeClr>
+          </a:lnRef>
+          <a:fillRef idx="1">
+            <a:schemeClr val="accent1"/>
+          </a:fillRef>
+          <a:effectRef idx="0">
+            <a:schemeClr val="accent1"/>
+          </a:effectRef>
+          <a:fontRef idx="minor">
+            <a:schemeClr val="lt1"/>
+          </a:fontRef>
+        </p:style>
+        <p:txBody>
+          <a:bodyPr rtlCol="0" anchor="ctr"/>
+          <a:lstStyle/>
+          <a:p>
+            <a:pPr algn="ctr"/>
+            <a:r>
+              <a:rPr lang="es-MX" dirty="0" err="1">
+                <a:solidFill>
+                  <a:sysClr val="windowText" lastClr="000000"/>
+                </a:solidFill>
+              </a:rPr>
+              <a:t>Name</a:t>
+            </a:r>
+            <a:endParaRPr lang="es-MX" dirty="0">
+              <a:solidFill>
+                <a:sysClr val="windowText" lastClr="000000"/>
+              </a:solidFill>
+            </a:endParaRPr>
+          </a:p>
+        </p:txBody>
+      </p:sp>
+      <p:sp>
+        <p:nvSpPr>
+          <p:cNvPr id="32" name="Rectángulo 31">
+            <a:extLst>
+              <a:ext uri="{FF2B5EF4-FFF2-40B4-BE49-F238E27FC236}">
+                <a16:creationId xmlns:a16="http://schemas.microsoft.com/office/drawing/2014/main" id="{B6F7253B-3EA6-CD9A-C383-A3AB937B0A60}"/>
+              </a:ext>
+            </a:extLst>
+          </p:cNvPr>
+          <p:cNvSpPr/>
+          <p:nvPr/>
+        </p:nvSpPr>
+        <p:spPr>
+          <a:xfrm>
+            <a:off x="9148028" y="1560410"/>
+            <a:ext cx="1582662" cy="238916"/>
+          </a:xfrm>
+          <a:prstGeom prst="rect">
+            <a:avLst/>
+          </a:prstGeom>
+          <a:solidFill>
+            <a:schemeClr val="bg1"/>
+          </a:solidFill>
+        </p:spPr>
+        <p:style>
+          <a:lnRef idx="2">
+            <a:schemeClr val="accent1">
+              <a:shade val="15000"/>
+            </a:schemeClr>
+          </a:lnRef>
+          <a:fillRef idx="1">
+            <a:schemeClr val="accent1"/>
+          </a:fillRef>
+          <a:effectRef idx="0">
+            <a:schemeClr val="accent1"/>
+          </a:effectRef>
+          <a:fontRef idx="minor">
+            <a:schemeClr val="lt1"/>
+          </a:fontRef>
+        </p:style>
+        <p:txBody>
+          <a:bodyPr rtlCol="0" anchor="ctr"/>
+          <a:lstStyle/>
+          <a:p>
+            <a:pPr algn="ctr"/>
+            <a:r>
+              <a:rPr lang="es-MX" dirty="0" err="1">
+                <a:solidFill>
+                  <a:sysClr val="windowText" lastClr="000000"/>
+                </a:solidFill>
+              </a:rPr>
+              <a:t>Str</a:t>
+            </a:r>
+            <a:endParaRPr lang="es-MX" dirty="0">
+              <a:solidFill>
+                <a:sysClr val="windowText" lastClr="000000"/>
+              </a:solidFill>
+            </a:endParaRPr>
+          </a:p>
+        </p:txBody>
+      </p:sp>
+      <p:sp>
+        <p:nvSpPr>
+          <p:cNvPr id="33" name="Triángulo isósceles 32">
+            <a:extLst>
+              <a:ext uri="{FF2B5EF4-FFF2-40B4-BE49-F238E27FC236}">
+                <a16:creationId xmlns:a16="http://schemas.microsoft.com/office/drawing/2014/main" id="{98380371-EA4B-65D3-DB23-2CB98CF3B2CE}"/>
+              </a:ext>
+            </a:extLst>
+          </p:cNvPr>
+          <p:cNvSpPr/>
+          <p:nvPr/>
+        </p:nvSpPr>
+        <p:spPr>
+          <a:xfrm rot="10800000">
+            <a:off x="10278546" y="1598934"/>
+            <a:ext cx="197636" cy="151455"/>
+          </a:xfrm>
+          <a:prstGeom prst="triangle">
+            <a:avLst/>
+          </a:prstGeom>
+        </p:spPr>
+        <p:style>
+          <a:lnRef idx="2">
+            <a:schemeClr val="accent1">
+              <a:shade val="15000"/>
+            </a:schemeClr>
+          </a:lnRef>
+          <a:fillRef idx="1">
+            <a:schemeClr val="accent1"/>
+          </a:fillRef>
+          <a:effectRef idx="0">
+            <a:schemeClr val="accent1"/>
+          </a:effectRef>
+          <a:fontRef idx="minor">
+            <a:schemeClr val="lt1"/>
+          </a:fontRef>
+        </p:style>
+        <p:txBody>
+          <a:bodyPr rtlCol="0" anchor="ctr"/>
+          <a:lstStyle/>
+          <a:p>
+            <a:pPr algn="ctr"/>
+            <a:endParaRPr lang="es-MX"/>
+          </a:p>
+        </p:txBody>
+      </p:sp>
+    </p:spTree>
+    <p:extLst>
+      <p:ext uri="{BB962C8B-B14F-4D97-AF65-F5344CB8AC3E}">
+        <p14:creationId xmlns:p14="http://schemas.microsoft.com/office/powerpoint/2010/main" val="545857240"/>
+      </p:ext>
+    </p:extLst>
+  </p:cSld>
+  <p:clrMapOvr>
+    <a:masterClrMapping/>
+  </p:clrMapOvr>
+</p:sld>
+</file>
+
 <file path=ppt/theme/theme1.xml><?xml version="1.0" encoding="utf-8"?>
 <a:theme xmlns:a="http://schemas.openxmlformats.org/drawingml/2006/main" name="Tema de Office">
   <a:themeElements>

</xml_diff>